<commit_message>
Táblázatkezelésppt modified with further functions
</commit_message>
<xml_diff>
--- a/excel/Táblázatkezelés.pptx
+++ b/excel/Táblázatkezelés.pptx
@@ -5,7 +5,7 @@
     <p:sldMasterId id="2147483659" r:id="rId1"/>
   </p:sldMasterIdLst>
   <p:notesMasterIdLst>
-    <p:notesMasterId r:id="rId46"/>
+    <p:notesMasterId r:id="rId50"/>
   </p:notesMasterIdLst>
   <p:sldIdLst>
     <p:sldId id="256" r:id="rId2"/>
@@ -26,47 +26,51 @@
     <p:sldId id="283" r:id="rId17"/>
     <p:sldId id="285" r:id="rId18"/>
     <p:sldId id="284" r:id="rId19"/>
-    <p:sldId id="286" r:id="rId20"/>
-    <p:sldId id="287" r:id="rId21"/>
-    <p:sldId id="297" r:id="rId22"/>
-    <p:sldId id="298" r:id="rId23"/>
-    <p:sldId id="288" r:id="rId24"/>
-    <p:sldId id="289" r:id="rId25"/>
-    <p:sldId id="290" r:id="rId26"/>
-    <p:sldId id="293" r:id="rId27"/>
-    <p:sldId id="291" r:id="rId28"/>
-    <p:sldId id="295" r:id="rId29"/>
-    <p:sldId id="294" r:id="rId30"/>
-    <p:sldId id="299" r:id="rId31"/>
-    <p:sldId id="296" r:id="rId32"/>
-    <p:sldId id="292" r:id="rId33"/>
-    <p:sldId id="270" r:id="rId34"/>
-    <p:sldId id="271" r:id="rId35"/>
-    <p:sldId id="272" r:id="rId36"/>
-    <p:sldId id="273" r:id="rId37"/>
-    <p:sldId id="274" r:id="rId38"/>
-    <p:sldId id="275" r:id="rId39"/>
-    <p:sldId id="276" r:id="rId40"/>
-    <p:sldId id="277" r:id="rId41"/>
-    <p:sldId id="278" r:id="rId42"/>
-    <p:sldId id="279" r:id="rId43"/>
-    <p:sldId id="280" r:id="rId44"/>
-    <p:sldId id="281" r:id="rId45"/>
+    <p:sldId id="300" r:id="rId20"/>
+    <p:sldId id="301" r:id="rId21"/>
+    <p:sldId id="286" r:id="rId22"/>
+    <p:sldId id="287" r:id="rId23"/>
+    <p:sldId id="297" r:id="rId24"/>
+    <p:sldId id="298" r:id="rId25"/>
+    <p:sldId id="302" r:id="rId26"/>
+    <p:sldId id="303" r:id="rId27"/>
+    <p:sldId id="288" r:id="rId28"/>
+    <p:sldId id="289" r:id="rId29"/>
+    <p:sldId id="290" r:id="rId30"/>
+    <p:sldId id="293" r:id="rId31"/>
+    <p:sldId id="291" r:id="rId32"/>
+    <p:sldId id="295" r:id="rId33"/>
+    <p:sldId id="294" r:id="rId34"/>
+    <p:sldId id="299" r:id="rId35"/>
+    <p:sldId id="296" r:id="rId36"/>
+    <p:sldId id="292" r:id="rId37"/>
+    <p:sldId id="270" r:id="rId38"/>
+    <p:sldId id="271" r:id="rId39"/>
+    <p:sldId id="272" r:id="rId40"/>
+    <p:sldId id="273" r:id="rId41"/>
+    <p:sldId id="274" r:id="rId42"/>
+    <p:sldId id="275" r:id="rId43"/>
+    <p:sldId id="276" r:id="rId44"/>
+    <p:sldId id="277" r:id="rId45"/>
+    <p:sldId id="278" r:id="rId46"/>
+    <p:sldId id="279" r:id="rId47"/>
+    <p:sldId id="280" r:id="rId48"/>
+    <p:sldId id="281" r:id="rId49"/>
   </p:sldIdLst>
   <p:sldSz cx="9144000" cy="5143500" type="screen16x9"/>
   <p:notesSz cx="6858000" cy="9144000"/>
   <p:embeddedFontLst>
     <p:embeddedFont>
       <p:font typeface="Open Sans" panose="020B0606030504020204" pitchFamily="34" charset="0"/>
-      <p:regular r:id="rId47"/>
-      <p:bold r:id="rId48"/>
-      <p:italic r:id="rId49"/>
-      <p:boldItalic r:id="rId50"/>
+      <p:regular r:id="rId51"/>
+      <p:bold r:id="rId52"/>
+      <p:italic r:id="rId53"/>
+      <p:boldItalic r:id="rId54"/>
     </p:embeddedFont>
     <p:embeddedFont>
       <p:font typeface="PT Sans Narrow" panose="020B0506020203020204" pitchFamily="34" charset="0"/>
-      <p:regular r:id="rId51"/>
-      <p:bold r:id="rId52"/>
+      <p:regular r:id="rId55"/>
+      <p:bold r:id="rId56"/>
     </p:embeddedFont>
   </p:embeddedFontLst>
   <p:defaultTextStyle>
@@ -787,8 +791,8 @@
         </p:nvSpPr>
         <p:spPr>
           <a:xfrm>
-            <a:off x="381300" y="685800"/>
-            <a:ext cx="6096075" cy="3429000"/>
+            <a:off x="381000" y="685800"/>
+            <a:ext cx="6096000" cy="3429000"/>
           </a:xfrm>
           <a:custGeom>
             <a:avLst/>
@@ -11048,7 +11052,7 @@
         <p:spPr>
           <a:xfrm>
             <a:off x="2137225" y="2850039"/>
-            <a:ext cx="4870500" cy="792600"/>
+            <a:ext cx="4870500" cy="973816"/>
           </a:xfrm>
           <a:prstGeom prst="rect">
             <a:avLst/>
@@ -11070,10 +11074,10 @@
               <a:buNone/>
             </a:pPr>
             <a:r>
-              <a:rPr lang="hu"/>
+              <a:rPr lang="hu" dirty="0"/>
               <a:t>Készítette: Szalontai István</a:t>
             </a:r>
-            <a:endParaRPr/>
+            <a:endParaRPr dirty="0"/>
           </a:p>
           <a:p>
             <a:pPr marL="0" lvl="0" indent="0" algn="ctr" rtl="0">
@@ -11086,10 +11090,10 @@
               <a:buNone/>
             </a:pPr>
             <a:r>
-              <a:rPr lang="hu"/>
+              <a:rPr lang="hu" dirty="0"/>
               <a:t>Dátum: 2025-01-13</a:t>
             </a:r>
-            <a:endParaRPr/>
+            <a:endParaRPr dirty="0"/>
           </a:p>
           <a:p>
             <a:pPr marL="0" lvl="0" indent="0" algn="ctr" rtl="0">
@@ -11102,10 +11106,25 @@
               <a:buNone/>
             </a:pPr>
             <a:r>
-              <a:rPr lang="hu"/>
+              <a:rPr lang="hu" dirty="0"/>
               <a:t>Kinek: 9 nyek tanulók részére</a:t>
             </a:r>
-            <a:endParaRPr/>
+          </a:p>
+          <a:p>
+            <a:pPr marL="0" lvl="0" indent="0" algn="ctr" rtl="0">
+              <a:spcBef>
+                <a:spcPts val="0"/>
+              </a:spcBef>
+              <a:spcAft>
+                <a:spcPts val="0"/>
+              </a:spcAft>
+              <a:buNone/>
+            </a:pPr>
+            <a:r>
+              <a:rPr lang="hu-HU" dirty="0"/>
+              <a:t>Verzió: 2025-03-27</a:t>
+            </a:r>
+            <a:endParaRPr dirty="0"/>
           </a:p>
         </p:txBody>
       </p:sp>
@@ -13194,13 +13213,7 @@
   <p:cSld>
     <p:spTree>
       <p:nvGrpSpPr>
-        <p:cNvPr id="1" name="Shape 150">
-          <a:extLst>
-            <a:ext uri="{FF2B5EF4-FFF2-40B4-BE49-F238E27FC236}">
-              <a16:creationId xmlns:a16="http://schemas.microsoft.com/office/drawing/2014/main" id="{475D1640-3574-AD28-DF81-1A46087A2AF9}"/>
-            </a:ext>
-          </a:extLst>
-        </p:cNvPr>
+        <p:cNvPr id="1" name=""/>
         <p:cNvGrpSpPr/>
         <p:nvPr/>
       </p:nvGrpSpPr>
@@ -13214,66 +13227,45 @@
       </p:grpSpPr>
       <p:sp>
         <p:nvSpPr>
-          <p:cNvPr id="151" name="Google Shape;151;p25">
+          <p:cNvPr id="2" name="Cím 1">
             <a:extLst>
               <a:ext uri="{FF2B5EF4-FFF2-40B4-BE49-F238E27FC236}">
-                <a16:creationId xmlns:a16="http://schemas.microsoft.com/office/drawing/2014/main" id="{B02226EB-7D4B-6484-D1D6-0098FAD42FF5}"/>
+                <a16:creationId xmlns:a16="http://schemas.microsoft.com/office/drawing/2014/main" id="{50C5C735-7ED4-E063-694D-D022ECD075AA}"/>
               </a:ext>
             </a:extLst>
           </p:cNvPr>
-          <p:cNvSpPr txBox="1">
+          <p:cNvSpPr>
             <a:spLocks noGrp="1"/>
           </p:cNvSpPr>
           <p:nvPr>
             <p:ph type="title"/>
           </p:nvPr>
         </p:nvSpPr>
-        <p:spPr>
-          <a:xfrm>
-            <a:off x="311700" y="445025"/>
-            <a:ext cx="8520600" cy="707400"/>
-          </a:xfrm>
-          <a:prstGeom prst="rect">
-            <a:avLst/>
-          </a:prstGeom>
-        </p:spPr>
+        <p:spPr/>
         <p:txBody>
-          <a:bodyPr spcFirstLastPara="1" wrap="square" lIns="91425" tIns="91425" rIns="91425" bIns="91425" anchor="t" anchorCtr="0">
+          <a:bodyPr>
             <a:normAutofit fontScale="90000"/>
           </a:bodyPr>
           <a:lstStyle/>
           <a:p>
-            <a:pPr marL="0" lvl="0" indent="0" algn="l" rtl="0">
-              <a:spcBef>
-                <a:spcPts val="0"/>
-              </a:spcBef>
-              <a:spcAft>
-                <a:spcPts val="0"/>
-              </a:spcAft>
-              <a:buNone/>
-            </a:pPr>
-            <a:r>
-              <a:rPr lang="en-US" dirty="0"/>
-              <a:t>MIN</a:t>
-            </a:r>
             <a:r>
               <a:rPr lang="hu-HU" dirty="0"/>
-              <a:t> Minimum, legkisebb érték</a:t>
-            </a:r>
-            <a:endParaRPr dirty="0"/>
+              <a:t>ÉS, VAGY logikai függvények</a:t>
+            </a:r>
+            <a:endParaRPr lang="en-US" dirty="0"/>
           </a:p>
         </p:txBody>
       </p:sp>
       <p:sp>
         <p:nvSpPr>
-          <p:cNvPr id="152" name="Google Shape;152;p25">
+          <p:cNvPr id="3" name="Szöveg helye 2">
             <a:extLst>
               <a:ext uri="{FF2B5EF4-FFF2-40B4-BE49-F238E27FC236}">
-                <a16:creationId xmlns:a16="http://schemas.microsoft.com/office/drawing/2014/main" id="{02CDFB13-0F15-AA41-1AF9-2C316B3A7136}"/>
+                <a16:creationId xmlns:a16="http://schemas.microsoft.com/office/drawing/2014/main" id="{912AFF95-22C8-6D35-76AB-BEAAF65FC0D0}"/>
               </a:ext>
             </a:extLst>
           </p:cNvPr>
-          <p:cNvSpPr txBox="1">
+          <p:cNvSpPr>
             <a:spLocks noGrp="1"/>
           </p:cNvSpPr>
           <p:nvPr>
@@ -13282,16 +13274,13 @@
         </p:nvSpPr>
         <p:spPr>
           <a:xfrm>
-            <a:off x="311700" y="1638561"/>
-            <a:ext cx="4811843" cy="2955210"/>
-          </a:xfrm>
-          <a:prstGeom prst="rect">
-            <a:avLst/>
-          </a:prstGeom>
+            <a:off x="311700" y="1266325"/>
+            <a:ext cx="4947620" cy="3302700"/>
+          </a:xfrm>
         </p:spPr>
         <p:txBody>
-          <a:bodyPr spcFirstLastPara="1" wrap="square" lIns="91425" tIns="91425" rIns="91425" bIns="91425" anchor="t" anchorCtr="0">
-            <a:normAutofit/>
+          <a:bodyPr>
+            <a:normAutofit lnSpcReduction="10000"/>
           </a:bodyPr>
           <a:lstStyle/>
           <a:p>
@@ -13306,7 +13295,7 @@
             </a:r>
             <a:r>
               <a:rPr lang="hu-HU" dirty="0"/>
-              <a:t>: Kiválasztott cellák közül a legkisebb értéket adja vissza.</a:t>
+              <a:t>: Logikai függvények. A HA függvénnyel együtt szoktuk használni</a:t>
             </a:r>
           </a:p>
           <a:p>
@@ -13329,11 +13318,11 @@
                   <a:srgbClr val="FFFF00"/>
                 </a:highlight>
               </a:rPr>
-              <a:t>=MIN(A1:A7) </a:t>
+              <a:t>=HA( ÉS(A1&gt;=4 ; A1&lt;= 6) ; "Közepes"  ; "") </a:t>
             </a:r>
             <a:r>
               <a:rPr lang="hu-HU" dirty="0"/>
-              <a:t>– Megadja a A1-től A7-ig tartó cellák legkisebb értékét.</a:t>
+              <a:t>– Ha A1 értéke nagyobb vagy egyenlő, mint 4 és kisebb vagy egyenlő mint 6 akkor ”Közepes”. Ez például egy 1-től 10-es pontozás esetén elképzelhető.</a:t>
             </a:r>
           </a:p>
           <a:p>
@@ -13348,7 +13337,15 @@
             </a:r>
             <a:r>
               <a:rPr lang="hu-HU" dirty="0"/>
-              <a:t>: Például a legkisebb osztályzat megtalálására.</a:t>
+              <a:t>: Például 1-10 –</a:t>
+            </a:r>
+            <a:r>
+              <a:rPr lang="hu-HU" dirty="0" err="1"/>
+              <a:t>ig</a:t>
+            </a:r>
+            <a:r>
+              <a:rPr lang="hu-HU" dirty="0"/>
+              <a:t> pontszámok értékelése.</a:t>
             </a:r>
           </a:p>
         </p:txBody>
@@ -13358,7 +13355,7 @@
           <p:cNvPr id="5" name="Kép 4">
             <a:extLst>
               <a:ext uri="{FF2B5EF4-FFF2-40B4-BE49-F238E27FC236}">
-                <a16:creationId xmlns:a16="http://schemas.microsoft.com/office/drawing/2014/main" id="{9478E3F4-0E2C-F77C-0378-D14E26DF7505}"/>
+                <a16:creationId xmlns:a16="http://schemas.microsoft.com/office/drawing/2014/main" id="{6C2BEEDD-C84B-F3DE-2E27-3594D853D944}"/>
               </a:ext>
             </a:extLst>
           </p:cNvPr>
@@ -13368,15 +13365,15 @@
           <p:nvPr/>
         </p:nvPicPr>
         <p:blipFill>
-          <a:blip r:embed="rId3"/>
+          <a:blip r:embed="rId2"/>
           <a:stretch>
             <a:fillRect/>
           </a:stretch>
         </p:blipFill>
         <p:spPr>
           <a:xfrm>
-            <a:off x="5057545" y="1257116"/>
-            <a:ext cx="3296110" cy="2629267"/>
+            <a:off x="5259320" y="1317343"/>
+            <a:ext cx="3190849" cy="2673732"/>
           </a:xfrm>
           <a:prstGeom prst="rect">
             <a:avLst/>
@@ -13386,7 +13383,7 @@
     </p:spTree>
     <p:extLst>
       <p:ext uri="{BB962C8B-B14F-4D97-AF65-F5344CB8AC3E}">
-        <p14:creationId xmlns:p14="http://schemas.microsoft.com/office/powerpoint/2010/main" val="843368199"/>
+        <p14:creationId xmlns:p14="http://schemas.microsoft.com/office/powerpoint/2010/main" val="352432771"/>
       </p:ext>
     </p:extLst>
   </p:cSld>
@@ -13593,6 +13590,703 @@
 </file>
 
 <file path=ppt/slides/slide20.xml><?xml version="1.0" encoding="utf-8"?>
+<p:sld xmlns:a="http://schemas.openxmlformats.org/drawingml/2006/main" xmlns:r="http://schemas.openxmlformats.org/officeDocument/2006/relationships" xmlns:p="http://schemas.openxmlformats.org/presentationml/2006/main">
+  <p:cSld>
+    <p:spTree>
+      <p:nvGrpSpPr>
+        <p:cNvPr id="1" name=""/>
+        <p:cNvGrpSpPr/>
+        <p:nvPr/>
+      </p:nvGrpSpPr>
+      <p:grpSpPr>
+        <a:xfrm>
+          <a:off x="0" y="0"/>
+          <a:ext cx="0" cy="0"/>
+          <a:chOff x="0" y="0"/>
+          <a:chExt cx="0" cy="0"/>
+        </a:xfrm>
+      </p:grpSpPr>
+      <p:sp>
+        <p:nvSpPr>
+          <p:cNvPr id="2" name="Cím 1">
+            <a:extLst>
+              <a:ext uri="{FF2B5EF4-FFF2-40B4-BE49-F238E27FC236}">
+                <a16:creationId xmlns:a16="http://schemas.microsoft.com/office/drawing/2014/main" id="{76C8A5E5-9771-F125-C781-D21ED96861BC}"/>
+              </a:ext>
+            </a:extLst>
+          </p:cNvPr>
+          <p:cNvSpPr>
+            <a:spLocks noGrp="1"/>
+          </p:cNvSpPr>
+          <p:nvPr>
+            <p:ph type="title"/>
+          </p:nvPr>
+        </p:nvSpPr>
+        <p:spPr/>
+        <p:txBody>
+          <a:bodyPr>
+            <a:normAutofit fontScale="90000"/>
+          </a:bodyPr>
+          <a:lstStyle/>
+          <a:p>
+            <a:r>
+              <a:rPr lang="hu-HU" dirty="0"/>
+              <a:t>Egymásba ágyazott HA függvények</a:t>
+            </a:r>
+            <a:endParaRPr lang="en-US" dirty="0"/>
+          </a:p>
+        </p:txBody>
+      </p:sp>
+      <p:sp>
+        <p:nvSpPr>
+          <p:cNvPr id="3" name="Szöveg helye 2">
+            <a:extLst>
+              <a:ext uri="{FF2B5EF4-FFF2-40B4-BE49-F238E27FC236}">
+                <a16:creationId xmlns:a16="http://schemas.microsoft.com/office/drawing/2014/main" id="{171CB01E-BFBC-2A0D-2C0E-034FD8F547D6}"/>
+              </a:ext>
+            </a:extLst>
+          </p:cNvPr>
+          <p:cNvSpPr>
+            <a:spLocks noGrp="1"/>
+          </p:cNvSpPr>
+          <p:nvPr>
+            <p:ph type="body" idx="1"/>
+          </p:nvPr>
+        </p:nvSpPr>
+        <p:spPr>
+          <a:xfrm>
+            <a:off x="311700" y="1266325"/>
+            <a:ext cx="4986014" cy="1106761"/>
+          </a:xfrm>
+        </p:spPr>
+        <p:txBody>
+          <a:bodyPr>
+            <a:normAutofit lnSpcReduction="10000"/>
+          </a:bodyPr>
+          <a:lstStyle/>
+          <a:p>
+            <a:r>
+              <a:rPr lang="hu-HU" b="1" dirty="0"/>
+              <a:t>Leírás</a:t>
+            </a:r>
+            <a:r>
+              <a:rPr lang="hu-HU" dirty="0"/>
+              <a:t>: Ha nem csak kétféle elágazást szeretnénk kezelni, hanem többet mint kettő.</a:t>
+            </a:r>
+            <a:endParaRPr lang="en-US" dirty="0"/>
+          </a:p>
+        </p:txBody>
+      </p:sp>
+      <p:pic>
+        <p:nvPicPr>
+          <p:cNvPr id="5" name="Kép 4">
+            <a:extLst>
+              <a:ext uri="{FF2B5EF4-FFF2-40B4-BE49-F238E27FC236}">
+                <a16:creationId xmlns:a16="http://schemas.microsoft.com/office/drawing/2014/main" id="{9DEC508A-275B-68BF-0186-EBCC7A49DB5C}"/>
+              </a:ext>
+            </a:extLst>
+          </p:cNvPr>
+          <p:cNvPicPr>
+            <a:picLocks noChangeAspect="1"/>
+          </p:cNvPicPr>
+          <p:nvPr/>
+        </p:nvPicPr>
+        <p:blipFill>
+          <a:blip r:embed="rId2"/>
+          <a:stretch>
+            <a:fillRect/>
+          </a:stretch>
+        </p:blipFill>
+        <p:spPr>
+          <a:xfrm>
+            <a:off x="5086146" y="1133375"/>
+            <a:ext cx="3389294" cy="2184789"/>
+          </a:xfrm>
+          <a:prstGeom prst="rect">
+            <a:avLst/>
+          </a:prstGeom>
+        </p:spPr>
+      </p:pic>
+      <p:sp>
+        <p:nvSpPr>
+          <p:cNvPr id="6" name="Szöveg helye 2">
+            <a:extLst>
+              <a:ext uri="{FF2B5EF4-FFF2-40B4-BE49-F238E27FC236}">
+                <a16:creationId xmlns:a16="http://schemas.microsoft.com/office/drawing/2014/main" id="{8BA270F2-6078-7336-3D0D-51734BE263F2}"/>
+              </a:ext>
+            </a:extLst>
+          </p:cNvPr>
+          <p:cNvSpPr txBox="1">
+            <a:spLocks/>
+          </p:cNvSpPr>
+          <p:nvPr/>
+        </p:nvSpPr>
+        <p:spPr>
+          <a:xfrm>
+            <a:off x="311700" y="3398237"/>
+            <a:ext cx="8340464" cy="1106761"/>
+          </a:xfrm>
+          <a:prstGeom prst="rect">
+            <a:avLst/>
+          </a:prstGeom>
+          <a:noFill/>
+          <a:ln>
+            <a:noFill/>
+          </a:ln>
+        </p:spPr>
+        <p:txBody>
+          <a:bodyPr spcFirstLastPara="1" wrap="square" lIns="91425" tIns="91425" rIns="91425" bIns="91425" anchor="t" anchorCtr="0">
+            <a:normAutofit/>
+          </a:bodyPr>
+          <a:lstStyle>
+            <a:defPPr marR="0" lvl="0" algn="l" rtl="0">
+              <a:lnSpc>
+                <a:spcPct val="100000"/>
+              </a:lnSpc>
+              <a:spcBef>
+                <a:spcPts val="0"/>
+              </a:spcBef>
+              <a:spcAft>
+                <a:spcPts val="0"/>
+              </a:spcAft>
+            </a:defPPr>
+            <a:lvl1pPr marL="457200" marR="0" lvl="0" indent="-342900" algn="l" rtl="0">
+              <a:lnSpc>
+                <a:spcPct val="115000"/>
+              </a:lnSpc>
+              <a:spcBef>
+                <a:spcPts val="0"/>
+              </a:spcBef>
+              <a:spcAft>
+                <a:spcPts val="0"/>
+              </a:spcAft>
+              <a:buClr>
+                <a:schemeClr val="dk2"/>
+              </a:buClr>
+              <a:buSzPts val="1800"/>
+              <a:buFont typeface="Open Sans"/>
+              <a:buChar char="●"/>
+              <a:defRPr sz="1800" b="0" i="0" u="none" strike="noStrike" cap="none">
+                <a:solidFill>
+                  <a:schemeClr val="dk2"/>
+                </a:solidFill>
+                <a:latin typeface="Open Sans"/>
+                <a:ea typeface="Open Sans"/>
+                <a:cs typeface="Open Sans"/>
+                <a:sym typeface="Open Sans"/>
+              </a:defRPr>
+            </a:lvl1pPr>
+            <a:lvl2pPr marL="914400" marR="0" lvl="1" indent="-317500" algn="l" rtl="0">
+              <a:lnSpc>
+                <a:spcPct val="115000"/>
+              </a:lnSpc>
+              <a:spcBef>
+                <a:spcPts val="0"/>
+              </a:spcBef>
+              <a:spcAft>
+                <a:spcPts val="0"/>
+              </a:spcAft>
+              <a:buClr>
+                <a:schemeClr val="dk2"/>
+              </a:buClr>
+              <a:buSzPts val="1400"/>
+              <a:buFont typeface="Open Sans"/>
+              <a:buChar char="○"/>
+              <a:defRPr sz="1400" b="0" i="0" u="none" strike="noStrike" cap="none">
+                <a:solidFill>
+                  <a:schemeClr val="dk2"/>
+                </a:solidFill>
+                <a:latin typeface="Open Sans"/>
+                <a:ea typeface="Open Sans"/>
+                <a:cs typeface="Open Sans"/>
+                <a:sym typeface="Open Sans"/>
+              </a:defRPr>
+            </a:lvl2pPr>
+            <a:lvl3pPr marL="1371600" marR="0" lvl="2" indent="-317500" algn="l" rtl="0">
+              <a:lnSpc>
+                <a:spcPct val="115000"/>
+              </a:lnSpc>
+              <a:spcBef>
+                <a:spcPts val="0"/>
+              </a:spcBef>
+              <a:spcAft>
+                <a:spcPts val="0"/>
+              </a:spcAft>
+              <a:buClr>
+                <a:schemeClr val="dk2"/>
+              </a:buClr>
+              <a:buSzPts val="1400"/>
+              <a:buFont typeface="Open Sans"/>
+              <a:buChar char="■"/>
+              <a:defRPr sz="1400" b="0" i="0" u="none" strike="noStrike" cap="none">
+                <a:solidFill>
+                  <a:schemeClr val="dk2"/>
+                </a:solidFill>
+                <a:latin typeface="Open Sans"/>
+                <a:ea typeface="Open Sans"/>
+                <a:cs typeface="Open Sans"/>
+                <a:sym typeface="Open Sans"/>
+              </a:defRPr>
+            </a:lvl3pPr>
+            <a:lvl4pPr marL="1828800" marR="0" lvl="3" indent="-317500" algn="l" rtl="0">
+              <a:lnSpc>
+                <a:spcPct val="115000"/>
+              </a:lnSpc>
+              <a:spcBef>
+                <a:spcPts val="0"/>
+              </a:spcBef>
+              <a:spcAft>
+                <a:spcPts val="0"/>
+              </a:spcAft>
+              <a:buClr>
+                <a:schemeClr val="dk2"/>
+              </a:buClr>
+              <a:buSzPts val="1400"/>
+              <a:buFont typeface="Open Sans"/>
+              <a:buChar char="●"/>
+              <a:defRPr sz="1400" b="0" i="0" u="none" strike="noStrike" cap="none">
+                <a:solidFill>
+                  <a:schemeClr val="dk2"/>
+                </a:solidFill>
+                <a:latin typeface="Open Sans"/>
+                <a:ea typeface="Open Sans"/>
+                <a:cs typeface="Open Sans"/>
+                <a:sym typeface="Open Sans"/>
+              </a:defRPr>
+            </a:lvl4pPr>
+            <a:lvl5pPr marL="2286000" marR="0" lvl="4" indent="-317500" algn="l" rtl="0">
+              <a:lnSpc>
+                <a:spcPct val="115000"/>
+              </a:lnSpc>
+              <a:spcBef>
+                <a:spcPts val="0"/>
+              </a:spcBef>
+              <a:spcAft>
+                <a:spcPts val="0"/>
+              </a:spcAft>
+              <a:buClr>
+                <a:schemeClr val="dk2"/>
+              </a:buClr>
+              <a:buSzPts val="1400"/>
+              <a:buFont typeface="Open Sans"/>
+              <a:buChar char="○"/>
+              <a:defRPr sz="1400" b="0" i="0" u="none" strike="noStrike" cap="none">
+                <a:solidFill>
+                  <a:schemeClr val="dk2"/>
+                </a:solidFill>
+                <a:latin typeface="Open Sans"/>
+                <a:ea typeface="Open Sans"/>
+                <a:cs typeface="Open Sans"/>
+                <a:sym typeface="Open Sans"/>
+              </a:defRPr>
+            </a:lvl5pPr>
+            <a:lvl6pPr marL="2743200" marR="0" lvl="5" indent="-317500" algn="l" rtl="0">
+              <a:lnSpc>
+                <a:spcPct val="115000"/>
+              </a:lnSpc>
+              <a:spcBef>
+                <a:spcPts val="0"/>
+              </a:spcBef>
+              <a:spcAft>
+                <a:spcPts val="0"/>
+              </a:spcAft>
+              <a:buClr>
+                <a:schemeClr val="dk2"/>
+              </a:buClr>
+              <a:buSzPts val="1400"/>
+              <a:buFont typeface="Open Sans"/>
+              <a:buChar char="■"/>
+              <a:defRPr sz="1400" b="0" i="0" u="none" strike="noStrike" cap="none">
+                <a:solidFill>
+                  <a:schemeClr val="dk2"/>
+                </a:solidFill>
+                <a:latin typeface="Open Sans"/>
+                <a:ea typeface="Open Sans"/>
+                <a:cs typeface="Open Sans"/>
+                <a:sym typeface="Open Sans"/>
+              </a:defRPr>
+            </a:lvl6pPr>
+            <a:lvl7pPr marL="3200400" marR="0" lvl="6" indent="-317500" algn="l" rtl="0">
+              <a:lnSpc>
+                <a:spcPct val="115000"/>
+              </a:lnSpc>
+              <a:spcBef>
+                <a:spcPts val="0"/>
+              </a:spcBef>
+              <a:spcAft>
+                <a:spcPts val="0"/>
+              </a:spcAft>
+              <a:buClr>
+                <a:schemeClr val="dk2"/>
+              </a:buClr>
+              <a:buSzPts val="1400"/>
+              <a:buFont typeface="Open Sans"/>
+              <a:buChar char="●"/>
+              <a:defRPr sz="1400" b="0" i="0" u="none" strike="noStrike" cap="none">
+                <a:solidFill>
+                  <a:schemeClr val="dk2"/>
+                </a:solidFill>
+                <a:latin typeface="Open Sans"/>
+                <a:ea typeface="Open Sans"/>
+                <a:cs typeface="Open Sans"/>
+                <a:sym typeface="Open Sans"/>
+              </a:defRPr>
+            </a:lvl7pPr>
+            <a:lvl8pPr marL="3657600" marR="0" lvl="7" indent="-317500" algn="l" rtl="0">
+              <a:lnSpc>
+                <a:spcPct val="115000"/>
+              </a:lnSpc>
+              <a:spcBef>
+                <a:spcPts val="0"/>
+              </a:spcBef>
+              <a:spcAft>
+                <a:spcPts val="0"/>
+              </a:spcAft>
+              <a:buClr>
+                <a:schemeClr val="dk2"/>
+              </a:buClr>
+              <a:buSzPts val="1400"/>
+              <a:buFont typeface="Open Sans"/>
+              <a:buChar char="○"/>
+              <a:defRPr sz="1400" b="0" i="0" u="none" strike="noStrike" cap="none">
+                <a:solidFill>
+                  <a:schemeClr val="dk2"/>
+                </a:solidFill>
+                <a:latin typeface="Open Sans"/>
+                <a:ea typeface="Open Sans"/>
+                <a:cs typeface="Open Sans"/>
+                <a:sym typeface="Open Sans"/>
+              </a:defRPr>
+            </a:lvl8pPr>
+            <a:lvl9pPr marL="4114800" marR="0" lvl="8" indent="-317500" algn="l" rtl="0">
+              <a:lnSpc>
+                <a:spcPct val="115000"/>
+              </a:lnSpc>
+              <a:spcBef>
+                <a:spcPts val="0"/>
+              </a:spcBef>
+              <a:spcAft>
+                <a:spcPts val="0"/>
+              </a:spcAft>
+              <a:buClr>
+                <a:schemeClr val="dk2"/>
+              </a:buClr>
+              <a:buSzPts val="1400"/>
+              <a:buFont typeface="Open Sans"/>
+              <a:buChar char="■"/>
+              <a:defRPr sz="1400" b="0" i="0" u="none" strike="noStrike" cap="none">
+                <a:solidFill>
+                  <a:schemeClr val="dk2"/>
+                </a:solidFill>
+                <a:latin typeface="Open Sans"/>
+                <a:ea typeface="Open Sans"/>
+                <a:cs typeface="Open Sans"/>
+                <a:sym typeface="Open Sans"/>
+              </a:defRPr>
+            </a:lvl9pPr>
+          </a:lstStyle>
+          <a:p>
+            <a:r>
+              <a:rPr lang="hu-HU" b="1" dirty="0"/>
+              <a:t>Példa</a:t>
+            </a:r>
+            <a:r>
+              <a:rPr lang="hu-HU" dirty="0"/>
+              <a:t>: </a:t>
+            </a:r>
+            <a:r>
+              <a:rPr lang="it-IT" dirty="0">
+                <a:highlight>
+                  <a:srgbClr val="FFFF00"/>
+                </a:highlight>
+              </a:rPr>
+              <a:t>=HA(A2&gt;=4</a:t>
+            </a:r>
+            <a:r>
+              <a:rPr lang="hu-HU" dirty="0">
+                <a:highlight>
+                  <a:srgbClr val="FFFF00"/>
+                </a:highlight>
+              </a:rPr>
+              <a:t>;</a:t>
+            </a:r>
+            <a:r>
+              <a:rPr lang="it-IT" dirty="0">
+                <a:highlight>
+                  <a:srgbClr val="00FF00"/>
+                </a:highlight>
+              </a:rPr>
+              <a:t>HA(A2&gt;8</a:t>
+            </a:r>
+            <a:r>
+              <a:rPr lang="hu-HU" dirty="0">
+                <a:highlight>
+                  <a:srgbClr val="00FF00"/>
+                </a:highlight>
+              </a:rPr>
+              <a:t>;</a:t>
+            </a:r>
+            <a:r>
+              <a:rPr lang="it-IT" dirty="0">
+                <a:highlight>
+                  <a:srgbClr val="00FF00"/>
+                </a:highlight>
+              </a:rPr>
+              <a:t>"Fantasztikus " </a:t>
+            </a:r>
+            <a:r>
+              <a:rPr lang="hu-HU" dirty="0">
+                <a:highlight>
+                  <a:srgbClr val="00FF00"/>
+                </a:highlight>
+              </a:rPr>
+              <a:t> ; </a:t>
+            </a:r>
+            <a:r>
+              <a:rPr lang="it-IT" dirty="0">
+                <a:highlight>
+                  <a:srgbClr val="00FF00"/>
+                </a:highlight>
+              </a:rPr>
+              <a:t>"Közepes")</a:t>
+            </a:r>
+            <a:r>
+              <a:rPr lang="it-IT" dirty="0">
+                <a:highlight>
+                  <a:srgbClr val="FFFF00"/>
+                </a:highlight>
+              </a:rPr>
+              <a:t>,"Alkalmatlan")</a:t>
+            </a:r>
+            <a:endParaRPr lang="en-US" dirty="0">
+              <a:highlight>
+                <a:srgbClr val="FFFF00"/>
+              </a:highlight>
+            </a:endParaRPr>
+          </a:p>
+        </p:txBody>
+      </p:sp>
+    </p:spTree>
+    <p:extLst>
+      <p:ext uri="{BB962C8B-B14F-4D97-AF65-F5344CB8AC3E}">
+        <p14:creationId xmlns:p14="http://schemas.microsoft.com/office/powerpoint/2010/main" val="2364980928"/>
+      </p:ext>
+    </p:extLst>
+  </p:cSld>
+  <p:clrMapOvr>
+    <a:masterClrMapping/>
+  </p:clrMapOvr>
+</p:sld>
+</file>
+
+<file path=ppt/slides/slide21.xml><?xml version="1.0" encoding="utf-8"?>
+<p:sld xmlns:a="http://schemas.openxmlformats.org/drawingml/2006/main" xmlns:r="http://schemas.openxmlformats.org/officeDocument/2006/relationships" xmlns:p="http://schemas.openxmlformats.org/presentationml/2006/main">
+  <p:cSld>
+    <p:spTree>
+      <p:nvGrpSpPr>
+        <p:cNvPr id="1" name="Shape 150">
+          <a:extLst>
+            <a:ext uri="{FF2B5EF4-FFF2-40B4-BE49-F238E27FC236}">
+              <a16:creationId xmlns:a16="http://schemas.microsoft.com/office/drawing/2014/main" id="{475D1640-3574-AD28-DF81-1A46087A2AF9}"/>
+            </a:ext>
+          </a:extLst>
+        </p:cNvPr>
+        <p:cNvGrpSpPr/>
+        <p:nvPr/>
+      </p:nvGrpSpPr>
+      <p:grpSpPr>
+        <a:xfrm>
+          <a:off x="0" y="0"/>
+          <a:ext cx="0" cy="0"/>
+          <a:chOff x="0" y="0"/>
+          <a:chExt cx="0" cy="0"/>
+        </a:xfrm>
+      </p:grpSpPr>
+      <p:sp>
+        <p:nvSpPr>
+          <p:cNvPr id="151" name="Google Shape;151;p25">
+            <a:extLst>
+              <a:ext uri="{FF2B5EF4-FFF2-40B4-BE49-F238E27FC236}">
+                <a16:creationId xmlns:a16="http://schemas.microsoft.com/office/drawing/2014/main" id="{B02226EB-7D4B-6484-D1D6-0098FAD42FF5}"/>
+              </a:ext>
+            </a:extLst>
+          </p:cNvPr>
+          <p:cNvSpPr txBox="1">
+            <a:spLocks noGrp="1"/>
+          </p:cNvSpPr>
+          <p:nvPr>
+            <p:ph type="title"/>
+          </p:nvPr>
+        </p:nvSpPr>
+        <p:spPr>
+          <a:xfrm>
+            <a:off x="311700" y="445025"/>
+            <a:ext cx="8520600" cy="707400"/>
+          </a:xfrm>
+          <a:prstGeom prst="rect">
+            <a:avLst/>
+          </a:prstGeom>
+        </p:spPr>
+        <p:txBody>
+          <a:bodyPr spcFirstLastPara="1" wrap="square" lIns="91425" tIns="91425" rIns="91425" bIns="91425" anchor="t" anchorCtr="0">
+            <a:normAutofit fontScale="90000"/>
+          </a:bodyPr>
+          <a:lstStyle/>
+          <a:p>
+            <a:pPr marL="0" lvl="0" indent="0" algn="l" rtl="0">
+              <a:spcBef>
+                <a:spcPts val="0"/>
+              </a:spcBef>
+              <a:spcAft>
+                <a:spcPts val="0"/>
+              </a:spcAft>
+              <a:buNone/>
+            </a:pPr>
+            <a:r>
+              <a:rPr lang="en-US" dirty="0"/>
+              <a:t>MIN</a:t>
+            </a:r>
+            <a:r>
+              <a:rPr lang="hu-HU" dirty="0"/>
+              <a:t> Minimum, legkisebb érték</a:t>
+            </a:r>
+            <a:endParaRPr dirty="0"/>
+          </a:p>
+        </p:txBody>
+      </p:sp>
+      <p:sp>
+        <p:nvSpPr>
+          <p:cNvPr id="152" name="Google Shape;152;p25">
+            <a:extLst>
+              <a:ext uri="{FF2B5EF4-FFF2-40B4-BE49-F238E27FC236}">
+                <a16:creationId xmlns:a16="http://schemas.microsoft.com/office/drawing/2014/main" id="{02CDFB13-0F15-AA41-1AF9-2C316B3A7136}"/>
+              </a:ext>
+            </a:extLst>
+          </p:cNvPr>
+          <p:cNvSpPr txBox="1">
+            <a:spLocks noGrp="1"/>
+          </p:cNvSpPr>
+          <p:nvPr>
+            <p:ph type="body" idx="1"/>
+          </p:nvPr>
+        </p:nvSpPr>
+        <p:spPr>
+          <a:xfrm>
+            <a:off x="311700" y="1638561"/>
+            <a:ext cx="4811843" cy="2955210"/>
+          </a:xfrm>
+          <a:prstGeom prst="rect">
+            <a:avLst/>
+          </a:prstGeom>
+        </p:spPr>
+        <p:txBody>
+          <a:bodyPr spcFirstLastPara="1" wrap="square" lIns="91425" tIns="91425" rIns="91425" bIns="91425" anchor="t" anchorCtr="0">
+            <a:normAutofit/>
+          </a:bodyPr>
+          <a:lstStyle/>
+          <a:p>
+            <a:pPr marL="285750" indent="-285750">
+              <a:spcAft>
+                <a:spcPts val="600"/>
+              </a:spcAft>
+            </a:pPr>
+            <a:r>
+              <a:rPr lang="hu-HU" b="1" dirty="0"/>
+              <a:t>Leírás</a:t>
+            </a:r>
+            <a:r>
+              <a:rPr lang="hu-HU" dirty="0"/>
+              <a:t>: Kiválasztott cellák közül a legkisebb értéket adja vissza.</a:t>
+            </a:r>
+          </a:p>
+          <a:p>
+            <a:pPr marL="285750" indent="-285750">
+              <a:spcAft>
+                <a:spcPts val="600"/>
+              </a:spcAft>
+            </a:pPr>
+            <a:r>
+              <a:rPr lang="hu-HU" b="1" dirty="0"/>
+              <a:t>Példa</a:t>
+            </a:r>
+            <a:r>
+              <a:rPr lang="hu-HU" dirty="0"/>
+              <a:t>: </a:t>
+            </a:r>
+            <a:r>
+              <a:rPr lang="hu-HU" dirty="0">
+                <a:highlight>
+                  <a:srgbClr val="FFFF00"/>
+                </a:highlight>
+              </a:rPr>
+              <a:t>=MIN(A1:A7) </a:t>
+            </a:r>
+            <a:r>
+              <a:rPr lang="hu-HU" dirty="0"/>
+              <a:t>– Megadja a A1-től A7-ig tartó cellák legkisebb értékét.</a:t>
+            </a:r>
+          </a:p>
+          <a:p>
+            <a:pPr marL="285750" indent="-285750">
+              <a:spcAft>
+                <a:spcPts val="600"/>
+              </a:spcAft>
+            </a:pPr>
+            <a:r>
+              <a:rPr lang="hu-HU" b="1" dirty="0"/>
+              <a:t>Használat</a:t>
+            </a:r>
+            <a:r>
+              <a:rPr lang="hu-HU" dirty="0"/>
+              <a:t>: Például a legkisebb osztályzat megtalálására.</a:t>
+            </a:r>
+          </a:p>
+        </p:txBody>
+      </p:sp>
+      <p:pic>
+        <p:nvPicPr>
+          <p:cNvPr id="5" name="Kép 4">
+            <a:extLst>
+              <a:ext uri="{FF2B5EF4-FFF2-40B4-BE49-F238E27FC236}">
+                <a16:creationId xmlns:a16="http://schemas.microsoft.com/office/drawing/2014/main" id="{9478E3F4-0E2C-F77C-0378-D14E26DF7505}"/>
+              </a:ext>
+            </a:extLst>
+          </p:cNvPr>
+          <p:cNvPicPr>
+            <a:picLocks noChangeAspect="1"/>
+          </p:cNvPicPr>
+          <p:nvPr/>
+        </p:nvPicPr>
+        <p:blipFill>
+          <a:blip r:embed="rId3"/>
+          <a:stretch>
+            <a:fillRect/>
+          </a:stretch>
+        </p:blipFill>
+        <p:spPr>
+          <a:xfrm>
+            <a:off x="5057545" y="1257116"/>
+            <a:ext cx="3296110" cy="2629267"/>
+          </a:xfrm>
+          <a:prstGeom prst="rect">
+            <a:avLst/>
+          </a:prstGeom>
+        </p:spPr>
+      </p:pic>
+    </p:spTree>
+    <p:extLst>
+      <p:ext uri="{BB962C8B-B14F-4D97-AF65-F5344CB8AC3E}">
+        <p14:creationId xmlns:p14="http://schemas.microsoft.com/office/powerpoint/2010/main" val="843368199"/>
+      </p:ext>
+    </p:extLst>
+  </p:cSld>
+  <p:clrMapOvr>
+    <a:masterClrMapping/>
+  </p:clrMapOvr>
+</p:sld>
+</file>
+
+<file path=ppt/slides/slide22.xml><?xml version="1.0" encoding="utf-8"?>
 <p:sld xmlns:a="http://schemas.openxmlformats.org/drawingml/2006/main" xmlns:r="http://schemas.openxmlformats.org/officeDocument/2006/relationships" xmlns:p="http://schemas.openxmlformats.org/presentationml/2006/main">
   <p:cSld>
     <p:spTree>
@@ -13799,7 +14493,7 @@
 </p:sld>
 </file>
 
-<file path=ppt/slides/slide21.xml><?xml version="1.0" encoding="utf-8"?>
+<file path=ppt/slides/slide23.xml><?xml version="1.0" encoding="utf-8"?>
 <p:sld xmlns:a="http://schemas.openxmlformats.org/drawingml/2006/main" xmlns:r="http://schemas.openxmlformats.org/officeDocument/2006/relationships" xmlns:p="http://schemas.openxmlformats.org/presentationml/2006/main">
   <p:cSld>
     <p:spTree>
@@ -13990,7 +14684,7 @@
 </p:sld>
 </file>
 
-<file path=ppt/slides/slide22.xml><?xml version="1.0" encoding="utf-8"?>
+<file path=ppt/slides/slide24.xml><?xml version="1.0" encoding="utf-8"?>
 <p:sld xmlns:a="http://schemas.openxmlformats.org/drawingml/2006/main" xmlns:r="http://schemas.openxmlformats.org/officeDocument/2006/relationships" xmlns:p="http://schemas.openxmlformats.org/presentationml/2006/main">
   <p:cSld>
     <p:spTree>
@@ -14181,7 +14875,313 @@
 </p:sld>
 </file>
 
-<file path=ppt/slides/slide23.xml><?xml version="1.0" encoding="utf-8"?>
+<file path=ppt/slides/slide25.xml><?xml version="1.0" encoding="utf-8"?>
+<p:sld xmlns:a="http://schemas.openxmlformats.org/drawingml/2006/main" xmlns:r="http://schemas.openxmlformats.org/officeDocument/2006/relationships" xmlns:p="http://schemas.openxmlformats.org/presentationml/2006/main">
+  <p:cSld>
+    <p:spTree>
+      <p:nvGrpSpPr>
+        <p:cNvPr id="1" name=""/>
+        <p:cNvGrpSpPr/>
+        <p:nvPr/>
+      </p:nvGrpSpPr>
+      <p:grpSpPr>
+        <a:xfrm>
+          <a:off x="0" y="0"/>
+          <a:ext cx="0" cy="0"/>
+          <a:chOff x="0" y="0"/>
+          <a:chExt cx="0" cy="0"/>
+        </a:xfrm>
+      </p:grpSpPr>
+      <p:sp>
+        <p:nvSpPr>
+          <p:cNvPr id="2" name="Cím 1">
+            <a:extLst>
+              <a:ext uri="{FF2B5EF4-FFF2-40B4-BE49-F238E27FC236}">
+                <a16:creationId xmlns:a16="http://schemas.microsoft.com/office/drawing/2014/main" id="{48D74479-A24D-A824-17FA-4292FA0F3BDC}"/>
+              </a:ext>
+            </a:extLst>
+          </p:cNvPr>
+          <p:cNvSpPr>
+            <a:spLocks noGrp="1"/>
+          </p:cNvSpPr>
+          <p:nvPr>
+            <p:ph type="title"/>
+          </p:nvPr>
+        </p:nvSpPr>
+        <p:spPr/>
+        <p:txBody>
+          <a:bodyPr>
+            <a:normAutofit fontScale="90000"/>
+          </a:bodyPr>
+          <a:lstStyle/>
+          <a:p>
+            <a:r>
+              <a:rPr lang="hu-HU" dirty="0"/>
+              <a:t>Kerekítés</a:t>
+            </a:r>
+            <a:endParaRPr lang="en-US" dirty="0"/>
+          </a:p>
+        </p:txBody>
+      </p:sp>
+      <p:sp>
+        <p:nvSpPr>
+          <p:cNvPr id="3" name="Szöveg helye 2">
+            <a:extLst>
+              <a:ext uri="{FF2B5EF4-FFF2-40B4-BE49-F238E27FC236}">
+                <a16:creationId xmlns:a16="http://schemas.microsoft.com/office/drawing/2014/main" id="{76575FDD-B487-7D3C-5F8A-01D477A13E40}"/>
+              </a:ext>
+            </a:extLst>
+          </p:cNvPr>
+          <p:cNvSpPr>
+            <a:spLocks noGrp="1"/>
+          </p:cNvSpPr>
+          <p:nvPr>
+            <p:ph type="body" idx="1"/>
+          </p:nvPr>
+        </p:nvSpPr>
+        <p:spPr/>
+        <p:txBody>
+          <a:bodyPr/>
+          <a:lstStyle/>
+          <a:p>
+            <a:r>
+              <a:rPr lang="hu-HU" b="1" dirty="0"/>
+              <a:t>Leírás</a:t>
+            </a:r>
+            <a:r>
+              <a:rPr lang="hu-HU" dirty="0"/>
+              <a:t>: Számok kerekítése megadott tizedes jegyig.</a:t>
+            </a:r>
+          </a:p>
+          <a:p>
+            <a:r>
+              <a:rPr lang="hu-HU" dirty="0"/>
+              <a:t>Példa: Kerekítsük a pi-t 2 tizedes jegyre!</a:t>
+            </a:r>
+            <a:br>
+              <a:rPr lang="hu-HU" dirty="0"/>
+            </a:br>
+            <a:r>
+              <a:rPr lang="hu-HU" dirty="0">
+                <a:highlight>
+                  <a:srgbClr val="FFFF00"/>
+                </a:highlight>
+              </a:rPr>
+              <a:t>=KEREKÍTÉS(A2 ; 2)</a:t>
+            </a:r>
+            <a:endParaRPr lang="en-US" dirty="0">
+              <a:highlight>
+                <a:srgbClr val="FFFF00"/>
+              </a:highlight>
+            </a:endParaRPr>
+          </a:p>
+        </p:txBody>
+      </p:sp>
+      <p:pic>
+        <p:nvPicPr>
+          <p:cNvPr id="5" name="Kép 4">
+            <a:extLst>
+              <a:ext uri="{FF2B5EF4-FFF2-40B4-BE49-F238E27FC236}">
+                <a16:creationId xmlns:a16="http://schemas.microsoft.com/office/drawing/2014/main" id="{3A2B936D-10B5-1A2C-5A6D-AA8D62F74811}"/>
+              </a:ext>
+            </a:extLst>
+          </p:cNvPr>
+          <p:cNvPicPr>
+            <a:picLocks noChangeAspect="1"/>
+          </p:cNvPicPr>
+          <p:nvPr/>
+        </p:nvPicPr>
+        <p:blipFill>
+          <a:blip r:embed="rId2"/>
+          <a:stretch>
+            <a:fillRect/>
+          </a:stretch>
+        </p:blipFill>
+        <p:spPr>
+          <a:xfrm>
+            <a:off x="2641599" y="2571750"/>
+            <a:ext cx="3519199" cy="1390650"/>
+          </a:xfrm>
+          <a:prstGeom prst="rect">
+            <a:avLst/>
+          </a:prstGeom>
+        </p:spPr>
+      </p:pic>
+    </p:spTree>
+    <p:extLst>
+      <p:ext uri="{BB962C8B-B14F-4D97-AF65-F5344CB8AC3E}">
+        <p14:creationId xmlns:p14="http://schemas.microsoft.com/office/powerpoint/2010/main" val="513567054"/>
+      </p:ext>
+    </p:extLst>
+  </p:cSld>
+  <p:clrMapOvr>
+    <a:masterClrMapping/>
+  </p:clrMapOvr>
+</p:sld>
+</file>
+
+<file path=ppt/slides/slide26.xml><?xml version="1.0" encoding="utf-8"?>
+<p:sld xmlns:a="http://schemas.openxmlformats.org/drawingml/2006/main" xmlns:r="http://schemas.openxmlformats.org/officeDocument/2006/relationships" xmlns:p="http://schemas.openxmlformats.org/presentationml/2006/main">
+  <p:cSld>
+    <p:spTree>
+      <p:nvGrpSpPr>
+        <p:cNvPr id="1" name=""/>
+        <p:cNvGrpSpPr/>
+        <p:nvPr/>
+      </p:nvGrpSpPr>
+      <p:grpSpPr>
+        <a:xfrm>
+          <a:off x="0" y="0"/>
+          <a:ext cx="0" cy="0"/>
+          <a:chOff x="0" y="0"/>
+          <a:chExt cx="0" cy="0"/>
+        </a:xfrm>
+      </p:grpSpPr>
+      <p:sp>
+        <p:nvSpPr>
+          <p:cNvPr id="2" name="Cím 1">
+            <a:extLst>
+              <a:ext uri="{FF2B5EF4-FFF2-40B4-BE49-F238E27FC236}">
+                <a16:creationId xmlns:a16="http://schemas.microsoft.com/office/drawing/2014/main" id="{EF3FC57B-617A-8768-A0C4-659660DC5B98}"/>
+              </a:ext>
+            </a:extLst>
+          </p:cNvPr>
+          <p:cNvSpPr>
+            <a:spLocks noGrp="1"/>
+          </p:cNvSpPr>
+          <p:nvPr>
+            <p:ph type="title"/>
+          </p:nvPr>
+        </p:nvSpPr>
+        <p:spPr/>
+        <p:txBody>
+          <a:bodyPr>
+            <a:normAutofit fontScale="90000"/>
+          </a:bodyPr>
+          <a:lstStyle/>
+          <a:p>
+            <a:r>
+              <a:rPr lang="hu-HU" dirty="0"/>
+              <a:t>A SZÖVEG függvény</a:t>
+            </a:r>
+            <a:endParaRPr lang="en-US" dirty="0"/>
+          </a:p>
+        </p:txBody>
+      </p:sp>
+      <p:sp>
+        <p:nvSpPr>
+          <p:cNvPr id="3" name="Szöveg helye 2">
+            <a:extLst>
+              <a:ext uri="{FF2B5EF4-FFF2-40B4-BE49-F238E27FC236}">
+                <a16:creationId xmlns:a16="http://schemas.microsoft.com/office/drawing/2014/main" id="{CE277269-584D-B2B2-0B3C-ADF98DE19B47}"/>
+              </a:ext>
+            </a:extLst>
+          </p:cNvPr>
+          <p:cNvSpPr>
+            <a:spLocks noGrp="1"/>
+          </p:cNvSpPr>
+          <p:nvPr>
+            <p:ph type="body" idx="1"/>
+          </p:nvPr>
+        </p:nvSpPr>
+        <p:spPr/>
+        <p:txBody>
+          <a:bodyPr/>
+          <a:lstStyle/>
+          <a:p>
+            <a:r>
+              <a:rPr lang="hu-HU" b="1" dirty="0"/>
+              <a:t>Leírás</a:t>
+            </a:r>
+            <a:r>
+              <a:rPr lang="hu-HU" dirty="0"/>
+              <a:t>: Értéket konvertál egy adott számformátumú szöveggé.</a:t>
+            </a:r>
+          </a:p>
+          <a:p>
+            <a:r>
+              <a:rPr lang="hu-HU" dirty="0"/>
+              <a:t>Példa: Nézzük meg, hogy a születésünk napja a hét melyik napjára esik!</a:t>
+            </a:r>
+            <a:br>
+              <a:rPr lang="hu-HU" dirty="0"/>
+            </a:br>
+            <a:r>
+              <a:rPr lang="hu-HU" dirty="0">
+                <a:highlight>
+                  <a:srgbClr val="FFFF00"/>
+                </a:highlight>
+              </a:rPr>
+              <a:t>=SZÖVEG( A2 ; "</a:t>
+            </a:r>
+            <a:r>
+              <a:rPr lang="hu-HU" dirty="0" err="1">
+                <a:highlight>
+                  <a:srgbClr val="FFFF00"/>
+                </a:highlight>
+              </a:rPr>
+              <a:t>nnnn</a:t>
+            </a:r>
+            <a:r>
+              <a:rPr lang="hu-HU" dirty="0">
+                <a:highlight>
+                  <a:srgbClr val="FFFF00"/>
+                </a:highlight>
+              </a:rPr>
+              <a:t>")</a:t>
+            </a:r>
+            <a:endParaRPr lang="en-US" dirty="0">
+              <a:highlight>
+                <a:srgbClr val="FFFF00"/>
+              </a:highlight>
+            </a:endParaRPr>
+          </a:p>
+        </p:txBody>
+      </p:sp>
+      <p:pic>
+        <p:nvPicPr>
+          <p:cNvPr id="5" name="Kép 4">
+            <a:extLst>
+              <a:ext uri="{FF2B5EF4-FFF2-40B4-BE49-F238E27FC236}">
+                <a16:creationId xmlns:a16="http://schemas.microsoft.com/office/drawing/2014/main" id="{51B5BED7-1B3B-CF3C-BE84-4A50A9C1B5F7}"/>
+              </a:ext>
+            </a:extLst>
+          </p:cNvPr>
+          <p:cNvPicPr>
+            <a:picLocks noChangeAspect="1"/>
+          </p:cNvPicPr>
+          <p:nvPr/>
+        </p:nvPicPr>
+        <p:blipFill>
+          <a:blip r:embed="rId2"/>
+          <a:stretch>
+            <a:fillRect/>
+          </a:stretch>
+        </p:blipFill>
+        <p:spPr>
+          <a:xfrm>
+            <a:off x="4066979" y="2015836"/>
+            <a:ext cx="2348365" cy="2585022"/>
+          </a:xfrm>
+          <a:prstGeom prst="rect">
+            <a:avLst/>
+          </a:prstGeom>
+        </p:spPr>
+      </p:pic>
+    </p:spTree>
+    <p:extLst>
+      <p:ext uri="{BB962C8B-B14F-4D97-AF65-F5344CB8AC3E}">
+        <p14:creationId xmlns:p14="http://schemas.microsoft.com/office/powerpoint/2010/main" val="2179678597"/>
+      </p:ext>
+    </p:extLst>
+  </p:cSld>
+  <p:clrMapOvr>
+    <a:masterClrMapping/>
+  </p:clrMapOvr>
+</p:sld>
+</file>
+
+<file path=ppt/slides/slide27.xml><?xml version="1.0" encoding="utf-8"?>
 <p:sld xmlns:a="http://schemas.openxmlformats.org/drawingml/2006/main" xmlns:r="http://schemas.openxmlformats.org/officeDocument/2006/relationships" xmlns:p="http://schemas.openxmlformats.org/presentationml/2006/main">
   <p:cSld>
     <p:spTree>
@@ -14376,7 +15376,7 @@
 </p:sld>
 </file>
 
-<file path=ppt/slides/slide24.xml><?xml version="1.0" encoding="utf-8"?>
+<file path=ppt/slides/slide28.xml><?xml version="1.0" encoding="utf-8"?>
 <p:sld xmlns:a="http://schemas.openxmlformats.org/drawingml/2006/main" xmlns:r="http://schemas.openxmlformats.org/officeDocument/2006/relationships" xmlns:p="http://schemas.openxmlformats.org/presentationml/2006/main">
   <p:cSld>
     <p:spTree>
@@ -14606,7 +15606,7 @@
 </p:sld>
 </file>
 
-<file path=ppt/slides/slide25.xml><?xml version="1.0" encoding="utf-8"?>
+<file path=ppt/slides/slide29.xml><?xml version="1.0" encoding="utf-8"?>
 <p:sld xmlns:a="http://schemas.openxmlformats.org/drawingml/2006/main" xmlns:r="http://schemas.openxmlformats.org/officeDocument/2006/relationships" xmlns:p="http://schemas.openxmlformats.org/presentationml/2006/main">
   <p:cSld>
     <p:spTree>
@@ -14813,7 +15813,243 @@
 </p:sld>
 </file>
 
-<file path=ppt/slides/slide26.xml><?xml version="1.0" encoding="utf-8"?>
+<file path=ppt/slides/slide3.xml><?xml version="1.0" encoding="utf-8"?>
+<p:sld xmlns:a="http://schemas.openxmlformats.org/drawingml/2006/main" xmlns:r="http://schemas.openxmlformats.org/officeDocument/2006/relationships" xmlns:p="http://schemas.openxmlformats.org/presentationml/2006/main">
+  <p:cSld>
+    <p:spTree>
+      <p:nvGrpSpPr>
+        <p:cNvPr id="1" name="Shape 77"/>
+        <p:cNvGrpSpPr/>
+        <p:nvPr/>
+      </p:nvGrpSpPr>
+      <p:grpSpPr>
+        <a:xfrm>
+          <a:off x="0" y="0"/>
+          <a:ext cx="0" cy="0"/>
+          <a:chOff x="0" y="0"/>
+          <a:chExt cx="0" cy="0"/>
+        </a:xfrm>
+      </p:grpSpPr>
+      <p:sp>
+        <p:nvSpPr>
+          <p:cNvPr id="78" name="Google Shape;78;p15"/>
+          <p:cNvSpPr txBox="1">
+            <a:spLocks noGrp="1"/>
+          </p:cNvSpPr>
+          <p:nvPr>
+            <p:ph type="title"/>
+          </p:nvPr>
+        </p:nvSpPr>
+        <p:spPr>
+          <a:xfrm>
+            <a:off x="311700" y="445025"/>
+            <a:ext cx="8520600" cy="707400"/>
+          </a:xfrm>
+          <a:prstGeom prst="rect">
+            <a:avLst/>
+          </a:prstGeom>
+        </p:spPr>
+        <p:txBody>
+          <a:bodyPr spcFirstLastPara="1" wrap="square" lIns="91425" tIns="91425" rIns="91425" bIns="91425" anchor="t" anchorCtr="0">
+            <a:normAutofit fontScale="90000"/>
+          </a:bodyPr>
+          <a:lstStyle/>
+          <a:p>
+            <a:pPr marL="0" lvl="0" indent="0" algn="l" rtl="0">
+              <a:spcBef>
+                <a:spcPts val="0"/>
+              </a:spcBef>
+              <a:spcAft>
+                <a:spcPts val="0"/>
+              </a:spcAft>
+              <a:buNone/>
+            </a:pPr>
+            <a:r>
+              <a:rPr lang="hu"/>
+              <a:t>Felhasználási területek:</a:t>
+            </a:r>
+            <a:endParaRPr/>
+          </a:p>
+          <a:p>
+            <a:pPr marL="0" lvl="0" indent="0" algn="l" rtl="0">
+              <a:spcBef>
+                <a:spcPts val="0"/>
+              </a:spcBef>
+              <a:spcAft>
+                <a:spcPts val="0"/>
+              </a:spcAft>
+              <a:buNone/>
+            </a:pPr>
+            <a:endParaRPr/>
+          </a:p>
+          <a:p>
+            <a:pPr marL="0" lvl="0" indent="0" algn="l" rtl="0">
+              <a:spcBef>
+                <a:spcPts val="0"/>
+              </a:spcBef>
+              <a:spcAft>
+                <a:spcPts val="0"/>
+              </a:spcAft>
+              <a:buNone/>
+            </a:pPr>
+            <a:endParaRPr/>
+          </a:p>
+        </p:txBody>
+      </p:sp>
+      <p:sp>
+        <p:nvSpPr>
+          <p:cNvPr id="79" name="Google Shape;79;p15"/>
+          <p:cNvSpPr txBox="1">
+            <a:spLocks noGrp="1"/>
+          </p:cNvSpPr>
+          <p:nvPr>
+            <p:ph type="body" idx="1"/>
+          </p:nvPr>
+        </p:nvSpPr>
+        <p:spPr>
+          <a:xfrm>
+            <a:off x="311700" y="1266325"/>
+            <a:ext cx="8520600" cy="3302700"/>
+          </a:xfrm>
+          <a:prstGeom prst="rect">
+            <a:avLst/>
+          </a:prstGeom>
+        </p:spPr>
+        <p:txBody>
+          <a:bodyPr spcFirstLastPara="1" wrap="square" lIns="91425" tIns="91425" rIns="91425" bIns="91425" anchor="t" anchorCtr="0">
+            <a:normAutofit/>
+          </a:bodyPr>
+          <a:lstStyle/>
+          <a:p>
+            <a:pPr marL="457200" lvl="0" indent="-342900" algn="l" rtl="0">
+              <a:spcBef>
+                <a:spcPts val="0"/>
+              </a:spcBef>
+              <a:spcAft>
+                <a:spcPts val="0"/>
+              </a:spcAft>
+              <a:buSzPts val="1800"/>
+              <a:buChar char="●"/>
+            </a:pPr>
+            <a:r>
+              <a:rPr lang="hu"/>
+              <a:t>Pénzügyi tervezés és elemzés.</a:t>
+            </a:r>
+            <a:endParaRPr/>
+          </a:p>
+          <a:p>
+            <a:pPr marL="457200" lvl="0" indent="-342900" algn="l" rtl="0">
+              <a:spcBef>
+                <a:spcPts val="0"/>
+              </a:spcBef>
+              <a:spcAft>
+                <a:spcPts val="0"/>
+              </a:spcAft>
+              <a:buSzPts val="1800"/>
+              <a:buChar char="●"/>
+            </a:pPr>
+            <a:r>
+              <a:rPr lang="hu"/>
+              <a:t>Készletkezelés.</a:t>
+            </a:r>
+            <a:endParaRPr/>
+          </a:p>
+          <a:p>
+            <a:pPr marL="457200" lvl="0" indent="-342900" algn="l" rtl="0">
+              <a:spcBef>
+                <a:spcPts val="0"/>
+              </a:spcBef>
+              <a:spcAft>
+                <a:spcPts val="0"/>
+              </a:spcAft>
+              <a:buSzPts val="1800"/>
+              <a:buChar char="●"/>
+            </a:pPr>
+            <a:r>
+              <a:rPr lang="hu"/>
+              <a:t>Iskolai jegyzetek és nyilvántartások.</a:t>
+            </a:r>
+            <a:endParaRPr/>
+          </a:p>
+          <a:p>
+            <a:pPr marL="457200" lvl="0" indent="-342900" algn="l" rtl="0">
+              <a:spcBef>
+                <a:spcPts val="0"/>
+              </a:spcBef>
+              <a:spcAft>
+                <a:spcPts val="0"/>
+              </a:spcAft>
+              <a:buSzPts val="1800"/>
+              <a:buChar char="●"/>
+            </a:pPr>
+            <a:r>
+              <a:rPr lang="hu"/>
+              <a:t>Tudományos kutatás és statisztikai elemzések.</a:t>
+            </a:r>
+            <a:endParaRPr/>
+          </a:p>
+          <a:p>
+            <a:pPr marL="457200" lvl="0" indent="-342900" algn="l" rtl="0">
+              <a:spcBef>
+                <a:spcPts val="0"/>
+              </a:spcBef>
+              <a:spcAft>
+                <a:spcPts val="0"/>
+              </a:spcAft>
+              <a:buSzPts val="1800"/>
+              <a:buChar char="●"/>
+            </a:pPr>
+            <a:r>
+              <a:rPr lang="hu"/>
+              <a:t>Otthoni felhasználás:</a:t>
+            </a:r>
+            <a:endParaRPr/>
+          </a:p>
+          <a:p>
+            <a:pPr marL="914400" lvl="1" indent="-317500" algn="l" rtl="0">
+              <a:spcBef>
+                <a:spcPts val="0"/>
+              </a:spcBef>
+              <a:spcAft>
+                <a:spcPts val="0"/>
+              </a:spcAft>
+              <a:buSzPts val="1400"/>
+              <a:buChar char="○"/>
+            </a:pPr>
+            <a:r>
+              <a:rPr lang="hu"/>
+              <a:t>Családi költségvetés nyomon követése</a:t>
+            </a:r>
+            <a:endParaRPr/>
+          </a:p>
+          <a:p>
+            <a:pPr marL="914400" lvl="1" indent="-317500" algn="l" rtl="0">
+              <a:spcBef>
+                <a:spcPts val="0"/>
+              </a:spcBef>
+              <a:spcAft>
+                <a:spcPts val="0"/>
+              </a:spcAft>
+              <a:buSzPts val="1400"/>
+              <a:buChar char="○"/>
+            </a:pPr>
+            <a:r>
+              <a:rPr lang="hu"/>
+              <a:t>Autóval kapcsolatos szervizelések, tankolások nyomon követése</a:t>
+            </a:r>
+            <a:endParaRPr/>
+          </a:p>
+        </p:txBody>
+      </p:sp>
+    </p:spTree>
+  </p:cSld>
+  <p:clrMapOvr>
+    <a:masterClrMapping/>
+  </p:clrMapOvr>
+</p:sld>
+</file>
+
+<file path=ppt/slides/slide30.xml><?xml version="1.0" encoding="utf-8"?>
 <p:sld xmlns:a="http://schemas.openxmlformats.org/drawingml/2006/main" xmlns:r="http://schemas.openxmlformats.org/officeDocument/2006/relationships" xmlns:p="http://schemas.openxmlformats.org/presentationml/2006/main">
   <p:cSld>
     <p:spTree>
@@ -15020,7 +16256,7 @@
 </p:sld>
 </file>
 
-<file path=ppt/slides/slide27.xml><?xml version="1.0" encoding="utf-8"?>
+<file path=ppt/slides/slide31.xml><?xml version="1.0" encoding="utf-8"?>
 <p:sld xmlns:a="http://schemas.openxmlformats.org/drawingml/2006/main" xmlns:r="http://schemas.openxmlformats.org/officeDocument/2006/relationships" xmlns:p="http://schemas.openxmlformats.org/presentationml/2006/main">
   <p:cSld>
     <p:spTree>
@@ -15231,7 +16467,7 @@
 </p:sld>
 </file>
 
-<file path=ppt/slides/slide28.xml><?xml version="1.0" encoding="utf-8"?>
+<file path=ppt/slides/slide32.xml><?xml version="1.0" encoding="utf-8"?>
 <p:sld xmlns:a="http://schemas.openxmlformats.org/drawingml/2006/main" xmlns:r="http://schemas.openxmlformats.org/officeDocument/2006/relationships" xmlns:p="http://schemas.openxmlformats.org/presentationml/2006/main">
   <p:cSld>
     <p:spTree>
@@ -15434,7 +16670,7 @@
 </p:sld>
 </file>
 
-<file path=ppt/slides/slide29.xml><?xml version="1.0" encoding="utf-8"?>
+<file path=ppt/slides/slide33.xml><?xml version="1.0" encoding="utf-8"?>
 <p:sld xmlns:a="http://schemas.openxmlformats.org/drawingml/2006/main" xmlns:r="http://schemas.openxmlformats.org/officeDocument/2006/relationships" xmlns:p="http://schemas.openxmlformats.org/presentationml/2006/main">
   <p:cSld>
     <p:spTree>
@@ -15637,243 +16873,7 @@
 </p:sld>
 </file>
 
-<file path=ppt/slides/slide3.xml><?xml version="1.0" encoding="utf-8"?>
-<p:sld xmlns:a="http://schemas.openxmlformats.org/drawingml/2006/main" xmlns:r="http://schemas.openxmlformats.org/officeDocument/2006/relationships" xmlns:p="http://schemas.openxmlformats.org/presentationml/2006/main">
-  <p:cSld>
-    <p:spTree>
-      <p:nvGrpSpPr>
-        <p:cNvPr id="1" name="Shape 77"/>
-        <p:cNvGrpSpPr/>
-        <p:nvPr/>
-      </p:nvGrpSpPr>
-      <p:grpSpPr>
-        <a:xfrm>
-          <a:off x="0" y="0"/>
-          <a:ext cx="0" cy="0"/>
-          <a:chOff x="0" y="0"/>
-          <a:chExt cx="0" cy="0"/>
-        </a:xfrm>
-      </p:grpSpPr>
-      <p:sp>
-        <p:nvSpPr>
-          <p:cNvPr id="78" name="Google Shape;78;p15"/>
-          <p:cNvSpPr txBox="1">
-            <a:spLocks noGrp="1"/>
-          </p:cNvSpPr>
-          <p:nvPr>
-            <p:ph type="title"/>
-          </p:nvPr>
-        </p:nvSpPr>
-        <p:spPr>
-          <a:xfrm>
-            <a:off x="311700" y="445025"/>
-            <a:ext cx="8520600" cy="707400"/>
-          </a:xfrm>
-          <a:prstGeom prst="rect">
-            <a:avLst/>
-          </a:prstGeom>
-        </p:spPr>
-        <p:txBody>
-          <a:bodyPr spcFirstLastPara="1" wrap="square" lIns="91425" tIns="91425" rIns="91425" bIns="91425" anchor="t" anchorCtr="0">
-            <a:normAutofit fontScale="90000"/>
-          </a:bodyPr>
-          <a:lstStyle/>
-          <a:p>
-            <a:pPr marL="0" lvl="0" indent="0" algn="l" rtl="0">
-              <a:spcBef>
-                <a:spcPts val="0"/>
-              </a:spcBef>
-              <a:spcAft>
-                <a:spcPts val="0"/>
-              </a:spcAft>
-              <a:buNone/>
-            </a:pPr>
-            <a:r>
-              <a:rPr lang="hu"/>
-              <a:t>Felhasználási területek:</a:t>
-            </a:r>
-            <a:endParaRPr/>
-          </a:p>
-          <a:p>
-            <a:pPr marL="0" lvl="0" indent="0" algn="l" rtl="0">
-              <a:spcBef>
-                <a:spcPts val="0"/>
-              </a:spcBef>
-              <a:spcAft>
-                <a:spcPts val="0"/>
-              </a:spcAft>
-              <a:buNone/>
-            </a:pPr>
-            <a:endParaRPr/>
-          </a:p>
-          <a:p>
-            <a:pPr marL="0" lvl="0" indent="0" algn="l" rtl="0">
-              <a:spcBef>
-                <a:spcPts val="0"/>
-              </a:spcBef>
-              <a:spcAft>
-                <a:spcPts val="0"/>
-              </a:spcAft>
-              <a:buNone/>
-            </a:pPr>
-            <a:endParaRPr/>
-          </a:p>
-        </p:txBody>
-      </p:sp>
-      <p:sp>
-        <p:nvSpPr>
-          <p:cNvPr id="79" name="Google Shape;79;p15"/>
-          <p:cNvSpPr txBox="1">
-            <a:spLocks noGrp="1"/>
-          </p:cNvSpPr>
-          <p:nvPr>
-            <p:ph type="body" idx="1"/>
-          </p:nvPr>
-        </p:nvSpPr>
-        <p:spPr>
-          <a:xfrm>
-            <a:off x="311700" y="1266325"/>
-            <a:ext cx="8520600" cy="3302700"/>
-          </a:xfrm>
-          <a:prstGeom prst="rect">
-            <a:avLst/>
-          </a:prstGeom>
-        </p:spPr>
-        <p:txBody>
-          <a:bodyPr spcFirstLastPara="1" wrap="square" lIns="91425" tIns="91425" rIns="91425" bIns="91425" anchor="t" anchorCtr="0">
-            <a:normAutofit/>
-          </a:bodyPr>
-          <a:lstStyle/>
-          <a:p>
-            <a:pPr marL="457200" lvl="0" indent="-342900" algn="l" rtl="0">
-              <a:spcBef>
-                <a:spcPts val="0"/>
-              </a:spcBef>
-              <a:spcAft>
-                <a:spcPts val="0"/>
-              </a:spcAft>
-              <a:buSzPts val="1800"/>
-              <a:buChar char="●"/>
-            </a:pPr>
-            <a:r>
-              <a:rPr lang="hu"/>
-              <a:t>Pénzügyi tervezés és elemzés.</a:t>
-            </a:r>
-            <a:endParaRPr/>
-          </a:p>
-          <a:p>
-            <a:pPr marL="457200" lvl="0" indent="-342900" algn="l" rtl="0">
-              <a:spcBef>
-                <a:spcPts val="0"/>
-              </a:spcBef>
-              <a:spcAft>
-                <a:spcPts val="0"/>
-              </a:spcAft>
-              <a:buSzPts val="1800"/>
-              <a:buChar char="●"/>
-            </a:pPr>
-            <a:r>
-              <a:rPr lang="hu"/>
-              <a:t>Készletkezelés.</a:t>
-            </a:r>
-            <a:endParaRPr/>
-          </a:p>
-          <a:p>
-            <a:pPr marL="457200" lvl="0" indent="-342900" algn="l" rtl="0">
-              <a:spcBef>
-                <a:spcPts val="0"/>
-              </a:spcBef>
-              <a:spcAft>
-                <a:spcPts val="0"/>
-              </a:spcAft>
-              <a:buSzPts val="1800"/>
-              <a:buChar char="●"/>
-            </a:pPr>
-            <a:r>
-              <a:rPr lang="hu"/>
-              <a:t>Iskolai jegyzetek és nyilvántartások.</a:t>
-            </a:r>
-            <a:endParaRPr/>
-          </a:p>
-          <a:p>
-            <a:pPr marL="457200" lvl="0" indent="-342900" algn="l" rtl="0">
-              <a:spcBef>
-                <a:spcPts val="0"/>
-              </a:spcBef>
-              <a:spcAft>
-                <a:spcPts val="0"/>
-              </a:spcAft>
-              <a:buSzPts val="1800"/>
-              <a:buChar char="●"/>
-            </a:pPr>
-            <a:r>
-              <a:rPr lang="hu"/>
-              <a:t>Tudományos kutatás és statisztikai elemzések.</a:t>
-            </a:r>
-            <a:endParaRPr/>
-          </a:p>
-          <a:p>
-            <a:pPr marL="457200" lvl="0" indent="-342900" algn="l" rtl="0">
-              <a:spcBef>
-                <a:spcPts val="0"/>
-              </a:spcBef>
-              <a:spcAft>
-                <a:spcPts val="0"/>
-              </a:spcAft>
-              <a:buSzPts val="1800"/>
-              <a:buChar char="●"/>
-            </a:pPr>
-            <a:r>
-              <a:rPr lang="hu"/>
-              <a:t>Otthoni felhasználás:</a:t>
-            </a:r>
-            <a:endParaRPr/>
-          </a:p>
-          <a:p>
-            <a:pPr marL="914400" lvl="1" indent="-317500" algn="l" rtl="0">
-              <a:spcBef>
-                <a:spcPts val="0"/>
-              </a:spcBef>
-              <a:spcAft>
-                <a:spcPts val="0"/>
-              </a:spcAft>
-              <a:buSzPts val="1400"/>
-              <a:buChar char="○"/>
-            </a:pPr>
-            <a:r>
-              <a:rPr lang="hu"/>
-              <a:t>Családi költségvetés nyomon követése</a:t>
-            </a:r>
-            <a:endParaRPr/>
-          </a:p>
-          <a:p>
-            <a:pPr marL="914400" lvl="1" indent="-317500" algn="l" rtl="0">
-              <a:spcBef>
-                <a:spcPts val="0"/>
-              </a:spcBef>
-              <a:spcAft>
-                <a:spcPts val="0"/>
-              </a:spcAft>
-              <a:buSzPts val="1400"/>
-              <a:buChar char="○"/>
-            </a:pPr>
-            <a:r>
-              <a:rPr lang="hu"/>
-              <a:t>Autóval kapcsolatos szervizelések, tankolások nyomon követése</a:t>
-            </a:r>
-            <a:endParaRPr/>
-          </a:p>
-        </p:txBody>
-      </p:sp>
-    </p:spTree>
-  </p:cSld>
-  <p:clrMapOvr>
-    <a:masterClrMapping/>
-  </p:clrMapOvr>
-</p:sld>
-</file>
-
-<file path=ppt/slides/slide30.xml><?xml version="1.0" encoding="utf-8"?>
+<file path=ppt/slides/slide34.xml><?xml version="1.0" encoding="utf-8"?>
 <p:sld xmlns:a="http://schemas.openxmlformats.org/drawingml/2006/main" xmlns:r="http://schemas.openxmlformats.org/officeDocument/2006/relationships" xmlns:p="http://schemas.openxmlformats.org/presentationml/2006/main">
   <p:cSld>
     <p:spTree>
@@ -16165,7 +17165,7 @@
 </p:sld>
 </file>
 
-<file path=ppt/slides/slide31.xml><?xml version="1.0" encoding="utf-8"?>
+<file path=ppt/slides/slide35.xml><?xml version="1.0" encoding="utf-8"?>
 <p:sld xmlns:a="http://schemas.openxmlformats.org/drawingml/2006/main" xmlns:r="http://schemas.openxmlformats.org/officeDocument/2006/relationships" xmlns:p="http://schemas.openxmlformats.org/presentationml/2006/main">
   <p:cSld>
     <p:spTree>
@@ -16376,7 +17376,7 @@
 </p:sld>
 </file>
 
-<file path=ppt/slides/slide32.xml><?xml version="1.0" encoding="utf-8"?>
+<file path=ppt/slides/slide36.xml><?xml version="1.0" encoding="utf-8"?>
 <p:sld xmlns:a="http://schemas.openxmlformats.org/drawingml/2006/main" xmlns:r="http://schemas.openxmlformats.org/officeDocument/2006/relationships" xmlns:p="http://schemas.openxmlformats.org/presentationml/2006/main">
   <p:cSld>
     <p:spTree>
@@ -16595,7 +17595,7 @@
 </p:sld>
 </file>
 
-<file path=ppt/slides/slide33.xml><?xml version="1.0" encoding="utf-8"?>
+<file path=ppt/slides/slide37.xml><?xml version="1.0" encoding="utf-8"?>
 <p:sld xmlns:a="http://schemas.openxmlformats.org/drawingml/2006/main" xmlns:r="http://schemas.openxmlformats.org/officeDocument/2006/relationships" xmlns:p="http://schemas.openxmlformats.org/presentationml/2006/main">
   <p:cSld>
     <p:spTree>
@@ -16662,7 +17662,7 @@
 </p:sld>
 </file>
 
-<file path=ppt/slides/slide34.xml><?xml version="1.0" encoding="utf-8"?>
+<file path=ppt/slides/slide38.xml><?xml version="1.0" encoding="utf-8"?>
 <p:sld xmlns:a="http://schemas.openxmlformats.org/drawingml/2006/main" xmlns:r="http://schemas.openxmlformats.org/officeDocument/2006/relationships" xmlns:p="http://schemas.openxmlformats.org/presentationml/2006/main">
   <p:cSld>
     <p:spTree>
@@ -16809,7 +17809,7 @@
 </p:sld>
 </file>
 
-<file path=ppt/slides/slide35.xml><?xml version="1.0" encoding="utf-8"?>
+<file path=ppt/slides/slide39.xml><?xml version="1.0" encoding="utf-8"?>
 <p:sld xmlns:a="http://schemas.openxmlformats.org/drawingml/2006/main" xmlns:r="http://schemas.openxmlformats.org/officeDocument/2006/relationships" xmlns:p="http://schemas.openxmlformats.org/presentationml/2006/main">
   <p:cSld>
     <p:spTree>
@@ -17180,7 +18180,265 @@
 </p:sld>
 </file>
 
-<file path=ppt/slides/slide36.xml><?xml version="1.0" encoding="utf-8"?>
+<file path=ppt/slides/slide4.xml><?xml version="1.0" encoding="utf-8"?>
+<p:sld xmlns:a="http://schemas.openxmlformats.org/drawingml/2006/main" xmlns:r="http://schemas.openxmlformats.org/officeDocument/2006/relationships" xmlns:p="http://schemas.openxmlformats.org/presentationml/2006/main">
+  <p:cSld>
+    <p:spTree>
+      <p:nvGrpSpPr>
+        <p:cNvPr id="1" name="Shape 83"/>
+        <p:cNvGrpSpPr/>
+        <p:nvPr/>
+      </p:nvGrpSpPr>
+      <p:grpSpPr>
+        <a:xfrm>
+          <a:off x="0" y="0"/>
+          <a:ext cx="0" cy="0"/>
+          <a:chOff x="0" y="0"/>
+          <a:chExt cx="0" cy="0"/>
+        </a:xfrm>
+      </p:grpSpPr>
+      <p:sp>
+        <p:nvSpPr>
+          <p:cNvPr id="84" name="Google Shape;84;p16"/>
+          <p:cNvSpPr txBox="1">
+            <a:spLocks noGrp="1"/>
+          </p:cNvSpPr>
+          <p:nvPr>
+            <p:ph type="title"/>
+          </p:nvPr>
+        </p:nvSpPr>
+        <p:spPr>
+          <a:xfrm>
+            <a:off x="311700" y="445025"/>
+            <a:ext cx="8520600" cy="707400"/>
+          </a:xfrm>
+          <a:prstGeom prst="rect">
+            <a:avLst/>
+          </a:prstGeom>
+        </p:spPr>
+        <p:txBody>
+          <a:bodyPr spcFirstLastPara="1" wrap="square" lIns="91425" tIns="91425" rIns="91425" bIns="91425" anchor="t" anchorCtr="0">
+            <a:normAutofit fontScale="90000"/>
+          </a:bodyPr>
+          <a:lstStyle/>
+          <a:p>
+            <a:pPr marL="0" lvl="0" indent="0" algn="l" rtl="0">
+              <a:spcBef>
+                <a:spcPts val="0"/>
+              </a:spcBef>
+              <a:spcAft>
+                <a:spcPts val="0"/>
+              </a:spcAft>
+              <a:buNone/>
+            </a:pPr>
+            <a:r>
+              <a:rPr lang="hu"/>
+              <a:t>A táblázatkezelés története</a:t>
+            </a:r>
+            <a:endParaRPr/>
+          </a:p>
+        </p:txBody>
+      </p:sp>
+      <p:sp>
+        <p:nvSpPr>
+          <p:cNvPr id="85" name="Google Shape;85;p16"/>
+          <p:cNvSpPr txBox="1">
+            <a:spLocks noGrp="1"/>
+          </p:cNvSpPr>
+          <p:nvPr>
+            <p:ph type="body" idx="1"/>
+          </p:nvPr>
+        </p:nvSpPr>
+        <p:spPr>
+          <a:xfrm>
+            <a:off x="311700" y="1152475"/>
+            <a:ext cx="8520600" cy="1268400"/>
+          </a:xfrm>
+          <a:prstGeom prst="rect">
+            <a:avLst/>
+          </a:prstGeom>
+        </p:spPr>
+        <p:txBody>
+          <a:bodyPr spcFirstLastPara="1" wrap="square" lIns="91425" tIns="91425" rIns="91425" bIns="91425" anchor="t" anchorCtr="0">
+            <a:normAutofit fontScale="85000" lnSpcReduction="10000"/>
+          </a:bodyPr>
+          <a:lstStyle/>
+          <a:p>
+            <a:pPr marL="0" lvl="0" indent="0" algn="l" rtl="0">
+              <a:spcBef>
+                <a:spcPts val="0"/>
+              </a:spcBef>
+              <a:spcAft>
+                <a:spcPts val="1200"/>
+              </a:spcAft>
+              <a:buNone/>
+            </a:pPr>
+            <a:r>
+              <a:rPr lang="hu"/>
+              <a:t>Az első széles körben elterjedt táblázatkezelő program, a </a:t>
+            </a:r>
+            <a:r>
+              <a:rPr lang="hu" b="1"/>
+              <a:t>VisiCalc</a:t>
+            </a:r>
+            <a:r>
+              <a:rPr lang="hu"/>
+              <a:t>, amelyet két egyetemista, Dan Bricklin és Bob Frankston készített, 1979-ben jelent meg az Apple II számítógépen, utolsó változatát 1985-ben adták ki. A táblázatkezelő elvi felépítése azóta sem változott.</a:t>
+            </a:r>
+            <a:endParaRPr/>
+          </a:p>
+        </p:txBody>
+      </p:sp>
+      <p:pic>
+        <p:nvPicPr>
+          <p:cNvPr id="86" name="Google Shape;86;p16"/>
+          <p:cNvPicPr preferRelativeResize="0"/>
+          <p:nvPr/>
+        </p:nvPicPr>
+        <p:blipFill>
+          <a:blip r:embed="rId3">
+            <a:alphaModFix/>
+          </a:blip>
+          <a:stretch>
+            <a:fillRect/>
+          </a:stretch>
+        </p:blipFill>
+        <p:spPr>
+          <a:xfrm>
+            <a:off x="469500" y="2420875"/>
+            <a:ext cx="4500875" cy="2417825"/>
+          </a:xfrm>
+          <a:prstGeom prst="rect">
+            <a:avLst/>
+          </a:prstGeom>
+          <a:noFill/>
+          <a:ln>
+            <a:noFill/>
+          </a:ln>
+        </p:spPr>
+      </p:pic>
+      <p:pic>
+        <p:nvPicPr>
+          <p:cNvPr id="87" name="Google Shape;87;p16" descr="A look at the original electronic spreadsheet &quot;VisiCalc&quot; for the Apple II.  VisiCalc's release was one of two extremely important events to secure Apple's success.  The other was its deal with MECC enabling its dominance in the educational market." title="VisiCalc: The First Electronic Spreadsheet">
+            <a:hlinkClick r:id="rId4"/>
+          </p:cNvPr>
+          <p:cNvPicPr preferRelativeResize="0"/>
+          <p:nvPr/>
+        </p:nvPicPr>
+        <p:blipFill>
+          <a:blip r:embed="rId5">
+            <a:alphaModFix/>
+          </a:blip>
+          <a:stretch>
+            <a:fillRect/>
+          </a:stretch>
+        </p:blipFill>
+        <p:spPr>
+          <a:xfrm>
+            <a:off x="5122775" y="2573275"/>
+            <a:ext cx="3048000" cy="1714500"/>
+          </a:xfrm>
+          <a:prstGeom prst="rect">
+            <a:avLst/>
+          </a:prstGeom>
+          <a:noFill/>
+          <a:ln>
+            <a:noFill/>
+          </a:ln>
+        </p:spPr>
+      </p:pic>
+    </p:spTree>
+  </p:cSld>
+  <p:clrMapOvr>
+    <a:masterClrMapping/>
+  </p:clrMapOvr>
+  <p:timing>
+    <p:tnLst>
+      <p:par>
+        <p:cTn id="1" dur="indefinite" restart="never" nodeType="tmRoot">
+          <p:childTnLst>
+            <p:seq concurrent="1" nextAc="seek">
+              <p:cTn id="2" dur="indefinite" nodeType="mainSeq">
+                <p:childTnLst>
+                  <p:par>
+                    <p:cTn id="3" fill="hold">
+                      <p:stCondLst>
+                        <p:cond delay="indefinite"/>
+                      </p:stCondLst>
+                      <p:childTnLst>
+                        <p:par>
+                          <p:cTn id="4" fill="hold">
+                            <p:stCondLst>
+                              <p:cond delay="0"/>
+                            </p:stCondLst>
+                            <p:childTnLst>
+                              <p:par>
+                                <p:cTn id="5" presetID="10" presetClass="entr" presetSubtype="0" fill="hold" nodeType="clickEffect">
+                                  <p:stCondLst>
+                                    <p:cond delay="0"/>
+                                  </p:stCondLst>
+                                  <p:childTnLst>
+                                    <p:set>
+                                      <p:cBhvr>
+                                        <p:cTn id="6" dur="1" fill="hold">
+                                          <p:stCondLst>
+                                            <p:cond delay="0"/>
+                                          </p:stCondLst>
+                                        </p:cTn>
+                                        <p:tgtEl>
+                                          <p:spTgt spid="87"/>
+                                        </p:tgtEl>
+                                        <p:attrNameLst>
+                                          <p:attrName>style.visibility</p:attrName>
+                                        </p:attrNameLst>
+                                      </p:cBhvr>
+                                      <p:to>
+                                        <p:strVal val="visible"/>
+                                      </p:to>
+                                    </p:set>
+                                    <p:animEffect transition="in" filter="fade">
+                                      <p:cBhvr>
+                                        <p:cTn id="7" dur="1000"/>
+                                        <p:tgtEl>
+                                          <p:spTgt spid="87"/>
+                                        </p:tgtEl>
+                                      </p:cBhvr>
+                                    </p:animEffect>
+                                  </p:childTnLst>
+                                </p:cTn>
+                              </p:par>
+                            </p:childTnLst>
+                          </p:cTn>
+                        </p:par>
+                      </p:childTnLst>
+                    </p:cTn>
+                  </p:par>
+                </p:childTnLst>
+              </p:cTn>
+              <p:prevCondLst>
+                <p:cond evt="onPrev" delay="0">
+                  <p:tgtEl>
+                    <p:sldTgt/>
+                  </p:tgtEl>
+                </p:cond>
+              </p:prevCondLst>
+              <p:nextCondLst>
+                <p:cond evt="onNext" delay="0">
+                  <p:tgtEl>
+                    <p:sldTgt/>
+                  </p:tgtEl>
+                </p:cond>
+              </p:nextCondLst>
+            </p:seq>
+          </p:childTnLst>
+        </p:cTn>
+      </p:par>
+    </p:tnLst>
+  </p:timing>
+</p:sld>
+</file>
+
+<file path=ppt/slides/slide40.xml><?xml version="1.0" encoding="utf-8"?>
 <p:sld xmlns:a="http://schemas.openxmlformats.org/drawingml/2006/main" xmlns:r="http://schemas.openxmlformats.org/officeDocument/2006/relationships" xmlns:p="http://schemas.openxmlformats.org/presentationml/2006/main">
   <p:cSld>
     <p:spTree>
@@ -18471,7 +19729,7 @@
 </p:sld>
 </file>
 
-<file path=ppt/slides/slide37.xml><?xml version="1.0" encoding="utf-8"?>
+<file path=ppt/slides/slide41.xml><?xml version="1.0" encoding="utf-8"?>
 <p:sld xmlns:a="http://schemas.openxmlformats.org/drawingml/2006/main" xmlns:r="http://schemas.openxmlformats.org/officeDocument/2006/relationships" xmlns:p="http://schemas.openxmlformats.org/presentationml/2006/main">
   <p:cSld>
     <p:spTree>
@@ -18648,7 +19906,7 @@
 </p:sld>
 </file>
 
-<file path=ppt/slides/slide38.xml><?xml version="1.0" encoding="utf-8"?>
+<file path=ppt/slides/slide42.xml><?xml version="1.0" encoding="utf-8"?>
 <p:sld xmlns:a="http://schemas.openxmlformats.org/drawingml/2006/main" xmlns:r="http://schemas.openxmlformats.org/officeDocument/2006/relationships" xmlns:p="http://schemas.openxmlformats.org/presentationml/2006/main">
   <p:cSld>
     <p:spTree>
@@ -18869,7 +20127,7 @@
 </p:sld>
 </file>
 
-<file path=ppt/slides/slide39.xml><?xml version="1.0" encoding="utf-8"?>
+<file path=ppt/slides/slide43.xml><?xml version="1.0" encoding="utf-8"?>
 <p:sld xmlns:a="http://schemas.openxmlformats.org/drawingml/2006/main" xmlns:r="http://schemas.openxmlformats.org/officeDocument/2006/relationships" xmlns:p="http://schemas.openxmlformats.org/presentationml/2006/main">
   <p:cSld>
     <p:spTree>
@@ -19486,265 +20744,7 @@
 </p:sld>
 </file>
 
-<file path=ppt/slides/slide4.xml><?xml version="1.0" encoding="utf-8"?>
-<p:sld xmlns:a="http://schemas.openxmlformats.org/drawingml/2006/main" xmlns:r="http://schemas.openxmlformats.org/officeDocument/2006/relationships" xmlns:p="http://schemas.openxmlformats.org/presentationml/2006/main">
-  <p:cSld>
-    <p:spTree>
-      <p:nvGrpSpPr>
-        <p:cNvPr id="1" name="Shape 83"/>
-        <p:cNvGrpSpPr/>
-        <p:nvPr/>
-      </p:nvGrpSpPr>
-      <p:grpSpPr>
-        <a:xfrm>
-          <a:off x="0" y="0"/>
-          <a:ext cx="0" cy="0"/>
-          <a:chOff x="0" y="0"/>
-          <a:chExt cx="0" cy="0"/>
-        </a:xfrm>
-      </p:grpSpPr>
-      <p:sp>
-        <p:nvSpPr>
-          <p:cNvPr id="84" name="Google Shape;84;p16"/>
-          <p:cNvSpPr txBox="1">
-            <a:spLocks noGrp="1"/>
-          </p:cNvSpPr>
-          <p:nvPr>
-            <p:ph type="title"/>
-          </p:nvPr>
-        </p:nvSpPr>
-        <p:spPr>
-          <a:xfrm>
-            <a:off x="311700" y="445025"/>
-            <a:ext cx="8520600" cy="707400"/>
-          </a:xfrm>
-          <a:prstGeom prst="rect">
-            <a:avLst/>
-          </a:prstGeom>
-        </p:spPr>
-        <p:txBody>
-          <a:bodyPr spcFirstLastPara="1" wrap="square" lIns="91425" tIns="91425" rIns="91425" bIns="91425" anchor="t" anchorCtr="0">
-            <a:normAutofit fontScale="90000"/>
-          </a:bodyPr>
-          <a:lstStyle/>
-          <a:p>
-            <a:pPr marL="0" lvl="0" indent="0" algn="l" rtl="0">
-              <a:spcBef>
-                <a:spcPts val="0"/>
-              </a:spcBef>
-              <a:spcAft>
-                <a:spcPts val="0"/>
-              </a:spcAft>
-              <a:buNone/>
-            </a:pPr>
-            <a:r>
-              <a:rPr lang="hu"/>
-              <a:t>A táblázatkezelés története</a:t>
-            </a:r>
-            <a:endParaRPr/>
-          </a:p>
-        </p:txBody>
-      </p:sp>
-      <p:sp>
-        <p:nvSpPr>
-          <p:cNvPr id="85" name="Google Shape;85;p16"/>
-          <p:cNvSpPr txBox="1">
-            <a:spLocks noGrp="1"/>
-          </p:cNvSpPr>
-          <p:nvPr>
-            <p:ph type="body" idx="1"/>
-          </p:nvPr>
-        </p:nvSpPr>
-        <p:spPr>
-          <a:xfrm>
-            <a:off x="311700" y="1152475"/>
-            <a:ext cx="8520600" cy="1268400"/>
-          </a:xfrm>
-          <a:prstGeom prst="rect">
-            <a:avLst/>
-          </a:prstGeom>
-        </p:spPr>
-        <p:txBody>
-          <a:bodyPr spcFirstLastPara="1" wrap="square" lIns="91425" tIns="91425" rIns="91425" bIns="91425" anchor="t" anchorCtr="0">
-            <a:normAutofit fontScale="85000" lnSpcReduction="10000"/>
-          </a:bodyPr>
-          <a:lstStyle/>
-          <a:p>
-            <a:pPr marL="0" lvl="0" indent="0" algn="l" rtl="0">
-              <a:spcBef>
-                <a:spcPts val="0"/>
-              </a:spcBef>
-              <a:spcAft>
-                <a:spcPts val="1200"/>
-              </a:spcAft>
-              <a:buNone/>
-            </a:pPr>
-            <a:r>
-              <a:rPr lang="hu"/>
-              <a:t>Az első széles körben elterjedt táblázatkezelő program, a </a:t>
-            </a:r>
-            <a:r>
-              <a:rPr lang="hu" b="1"/>
-              <a:t>VisiCalc</a:t>
-            </a:r>
-            <a:r>
-              <a:rPr lang="hu"/>
-              <a:t>, amelyet két egyetemista, Dan Bricklin és Bob Frankston készített, 1979-ben jelent meg az Apple II számítógépen, utolsó változatát 1985-ben adták ki. A táblázatkezelő elvi felépítése azóta sem változott.</a:t>
-            </a:r>
-            <a:endParaRPr/>
-          </a:p>
-        </p:txBody>
-      </p:sp>
-      <p:pic>
-        <p:nvPicPr>
-          <p:cNvPr id="86" name="Google Shape;86;p16"/>
-          <p:cNvPicPr preferRelativeResize="0"/>
-          <p:nvPr/>
-        </p:nvPicPr>
-        <p:blipFill>
-          <a:blip r:embed="rId3">
-            <a:alphaModFix/>
-          </a:blip>
-          <a:stretch>
-            <a:fillRect/>
-          </a:stretch>
-        </p:blipFill>
-        <p:spPr>
-          <a:xfrm>
-            <a:off x="469500" y="2420875"/>
-            <a:ext cx="4500875" cy="2417825"/>
-          </a:xfrm>
-          <a:prstGeom prst="rect">
-            <a:avLst/>
-          </a:prstGeom>
-          <a:noFill/>
-          <a:ln>
-            <a:noFill/>
-          </a:ln>
-        </p:spPr>
-      </p:pic>
-      <p:pic>
-        <p:nvPicPr>
-          <p:cNvPr id="87" name="Google Shape;87;p16" descr="A look at the original electronic spreadsheet &quot;VisiCalc&quot; for the Apple II.  VisiCalc's release was one of two extremely important events to secure Apple's success.  The other was its deal with MECC enabling its dominance in the educational market." title="VisiCalc: The First Electronic Spreadsheet">
-            <a:hlinkClick r:id="rId4"/>
-          </p:cNvPr>
-          <p:cNvPicPr preferRelativeResize="0"/>
-          <p:nvPr/>
-        </p:nvPicPr>
-        <p:blipFill>
-          <a:blip r:embed="rId5">
-            <a:alphaModFix/>
-          </a:blip>
-          <a:stretch>
-            <a:fillRect/>
-          </a:stretch>
-        </p:blipFill>
-        <p:spPr>
-          <a:xfrm>
-            <a:off x="5122775" y="2573275"/>
-            <a:ext cx="3048000" cy="1714500"/>
-          </a:xfrm>
-          <a:prstGeom prst="rect">
-            <a:avLst/>
-          </a:prstGeom>
-          <a:noFill/>
-          <a:ln>
-            <a:noFill/>
-          </a:ln>
-        </p:spPr>
-      </p:pic>
-    </p:spTree>
-  </p:cSld>
-  <p:clrMapOvr>
-    <a:masterClrMapping/>
-  </p:clrMapOvr>
-  <p:timing>
-    <p:tnLst>
-      <p:par>
-        <p:cTn id="1" dur="indefinite" restart="never" nodeType="tmRoot">
-          <p:childTnLst>
-            <p:seq concurrent="1" nextAc="seek">
-              <p:cTn id="2" dur="indefinite" nodeType="mainSeq">
-                <p:childTnLst>
-                  <p:par>
-                    <p:cTn id="3" fill="hold">
-                      <p:stCondLst>
-                        <p:cond delay="indefinite"/>
-                      </p:stCondLst>
-                      <p:childTnLst>
-                        <p:par>
-                          <p:cTn id="4" fill="hold">
-                            <p:stCondLst>
-                              <p:cond delay="0"/>
-                            </p:stCondLst>
-                            <p:childTnLst>
-                              <p:par>
-                                <p:cTn id="5" presetID="10" presetClass="entr" presetSubtype="0" fill="hold" nodeType="clickEffect">
-                                  <p:stCondLst>
-                                    <p:cond delay="0"/>
-                                  </p:stCondLst>
-                                  <p:childTnLst>
-                                    <p:set>
-                                      <p:cBhvr>
-                                        <p:cTn id="6" dur="1" fill="hold">
-                                          <p:stCondLst>
-                                            <p:cond delay="0"/>
-                                          </p:stCondLst>
-                                        </p:cTn>
-                                        <p:tgtEl>
-                                          <p:spTgt spid="87"/>
-                                        </p:tgtEl>
-                                        <p:attrNameLst>
-                                          <p:attrName>style.visibility</p:attrName>
-                                        </p:attrNameLst>
-                                      </p:cBhvr>
-                                      <p:to>
-                                        <p:strVal val="visible"/>
-                                      </p:to>
-                                    </p:set>
-                                    <p:animEffect transition="in" filter="fade">
-                                      <p:cBhvr>
-                                        <p:cTn id="7" dur="1000"/>
-                                        <p:tgtEl>
-                                          <p:spTgt spid="87"/>
-                                        </p:tgtEl>
-                                      </p:cBhvr>
-                                    </p:animEffect>
-                                  </p:childTnLst>
-                                </p:cTn>
-                              </p:par>
-                            </p:childTnLst>
-                          </p:cTn>
-                        </p:par>
-                      </p:childTnLst>
-                    </p:cTn>
-                  </p:par>
-                </p:childTnLst>
-              </p:cTn>
-              <p:prevCondLst>
-                <p:cond evt="onPrev" delay="0">
-                  <p:tgtEl>
-                    <p:sldTgt/>
-                  </p:tgtEl>
-                </p:cond>
-              </p:prevCondLst>
-              <p:nextCondLst>
-                <p:cond evt="onNext" delay="0">
-                  <p:tgtEl>
-                    <p:sldTgt/>
-                  </p:tgtEl>
-                </p:cond>
-              </p:nextCondLst>
-            </p:seq>
-          </p:childTnLst>
-        </p:cTn>
-      </p:par>
-    </p:tnLst>
-  </p:timing>
-</p:sld>
-</file>
-
-<file path=ppt/slides/slide40.xml><?xml version="1.0" encoding="utf-8"?>
+<file path=ppt/slides/slide44.xml><?xml version="1.0" encoding="utf-8"?>
 <p:sld xmlns:a="http://schemas.openxmlformats.org/drawingml/2006/main" xmlns:r="http://schemas.openxmlformats.org/officeDocument/2006/relationships" xmlns:p="http://schemas.openxmlformats.org/presentationml/2006/main">
   <p:cSld>
     <p:spTree>
@@ -20071,7 +21071,7 @@
 </p:sld>
 </file>
 
-<file path=ppt/slides/slide41.xml><?xml version="1.0" encoding="utf-8"?>
+<file path=ppt/slides/slide45.xml><?xml version="1.0" encoding="utf-8"?>
 <p:sld xmlns:a="http://schemas.openxmlformats.org/drawingml/2006/main" xmlns:r="http://schemas.openxmlformats.org/officeDocument/2006/relationships" xmlns:p="http://schemas.openxmlformats.org/presentationml/2006/main">
   <p:cSld>
     <p:spTree>
@@ -21160,7 +22160,7 @@
 </p:sld>
 </file>
 
-<file path=ppt/slides/slide42.xml><?xml version="1.0" encoding="utf-8"?>
+<file path=ppt/slides/slide46.xml><?xml version="1.0" encoding="utf-8"?>
 <p:sld xmlns:a="http://schemas.openxmlformats.org/drawingml/2006/main" xmlns:r="http://schemas.openxmlformats.org/officeDocument/2006/relationships" xmlns:p="http://schemas.openxmlformats.org/presentationml/2006/main">
   <p:cSld>
     <p:spTree>
@@ -21436,7 +22436,7 @@
 </p:sld>
 </file>
 
-<file path=ppt/slides/slide43.xml><?xml version="1.0" encoding="utf-8"?>
+<file path=ppt/slides/slide47.xml><?xml version="1.0" encoding="utf-8"?>
 <p:sld xmlns:a="http://schemas.openxmlformats.org/drawingml/2006/main" xmlns:r="http://schemas.openxmlformats.org/officeDocument/2006/relationships" xmlns:p="http://schemas.openxmlformats.org/presentationml/2006/main">
   <p:cSld>
     <p:spTree>
@@ -21575,7 +22575,7 @@
 </p:sld>
 </file>
 
-<file path=ppt/slides/slide44.xml><?xml version="1.0" encoding="utf-8"?>
+<file path=ppt/slides/slide48.xml><?xml version="1.0" encoding="utf-8"?>
 <p:sld xmlns:a="http://schemas.openxmlformats.org/drawingml/2006/main" xmlns:r="http://schemas.openxmlformats.org/officeDocument/2006/relationships" xmlns:p="http://schemas.openxmlformats.org/presentationml/2006/main">
   <p:cSld>
     <p:spTree>

</xml_diff>